<commit_message>
update of storyboard and graphical review of the presentation
</commit_message>
<xml_diff>
--- a/presentation/presentazione FAO.pptx
+++ b/presentation/presentazione FAO.pptx
@@ -287,7 +287,7 @@
           <a:p>
             <a:fld id="{C513A26C-1484-4743-BBFB-ED973AB48944}" type="datetimeFigureOut">
               <a:rPr lang="it-IT" smtClean="0"/>
-              <a:t>04/11/2020</a:t>
+              <a:t>05/11/20</a:t>
             </a:fld>
             <a:endParaRPr lang="it-IT"/>
           </a:p>
@@ -341,7 +341,7 @@
           <a:p>
             <a:fld id="{4459AEA4-8903-45F8-8472-1F4F976680A3}" type="slidenum">
               <a:rPr lang="it-IT" smtClean="0"/>
-              <a:t>‹N›</a:t>
+              <a:t>‹#›</a:t>
             </a:fld>
             <a:endParaRPr lang="it-IT"/>
           </a:p>
@@ -485,7 +485,7 @@
           <a:p>
             <a:fld id="{C513A26C-1484-4743-BBFB-ED973AB48944}" type="datetimeFigureOut">
               <a:rPr lang="it-IT" smtClean="0"/>
-              <a:t>04/11/2020</a:t>
+              <a:t>05/11/20</a:t>
             </a:fld>
             <a:endParaRPr lang="it-IT"/>
           </a:p>
@@ -539,7 +539,7 @@
           <a:p>
             <a:fld id="{4459AEA4-8903-45F8-8472-1F4F976680A3}" type="slidenum">
               <a:rPr lang="it-IT" smtClean="0"/>
-              <a:t>‹N›</a:t>
+              <a:t>‹#›</a:t>
             </a:fld>
             <a:endParaRPr lang="it-IT"/>
           </a:p>
@@ -693,7 +693,7 @@
           <a:p>
             <a:fld id="{C513A26C-1484-4743-BBFB-ED973AB48944}" type="datetimeFigureOut">
               <a:rPr lang="it-IT" smtClean="0"/>
-              <a:t>04/11/2020</a:t>
+              <a:t>05/11/20</a:t>
             </a:fld>
             <a:endParaRPr lang="it-IT"/>
           </a:p>
@@ -747,7 +747,7 @@
           <a:p>
             <a:fld id="{4459AEA4-8903-45F8-8472-1F4F976680A3}" type="slidenum">
               <a:rPr lang="it-IT" smtClean="0"/>
-              <a:t>‹N›</a:t>
+              <a:t>‹#›</a:t>
             </a:fld>
             <a:endParaRPr lang="it-IT"/>
           </a:p>
@@ -891,7 +891,7 @@
           <a:p>
             <a:fld id="{C513A26C-1484-4743-BBFB-ED973AB48944}" type="datetimeFigureOut">
               <a:rPr lang="it-IT" smtClean="0"/>
-              <a:t>04/11/2020</a:t>
+              <a:t>05/11/20</a:t>
             </a:fld>
             <a:endParaRPr lang="it-IT"/>
           </a:p>
@@ -945,7 +945,7 @@
           <a:p>
             <a:fld id="{4459AEA4-8903-45F8-8472-1F4F976680A3}" type="slidenum">
               <a:rPr lang="it-IT" smtClean="0"/>
-              <a:t>‹N›</a:t>
+              <a:t>‹#›</a:t>
             </a:fld>
             <a:endParaRPr lang="it-IT"/>
           </a:p>
@@ -1166,7 +1166,7 @@
           <a:p>
             <a:fld id="{C513A26C-1484-4743-BBFB-ED973AB48944}" type="datetimeFigureOut">
               <a:rPr lang="it-IT" smtClean="0"/>
-              <a:t>04/11/2020</a:t>
+              <a:t>05/11/20</a:t>
             </a:fld>
             <a:endParaRPr lang="it-IT"/>
           </a:p>
@@ -1220,7 +1220,7 @@
           <a:p>
             <a:fld id="{4459AEA4-8903-45F8-8472-1F4F976680A3}" type="slidenum">
               <a:rPr lang="it-IT" smtClean="0"/>
-              <a:t>‹N›</a:t>
+              <a:t>‹#›</a:t>
             </a:fld>
             <a:endParaRPr lang="it-IT"/>
           </a:p>
@@ -1431,7 +1431,7 @@
           <a:p>
             <a:fld id="{C513A26C-1484-4743-BBFB-ED973AB48944}" type="datetimeFigureOut">
               <a:rPr lang="it-IT" smtClean="0"/>
-              <a:t>04/11/2020</a:t>
+              <a:t>05/11/20</a:t>
             </a:fld>
             <a:endParaRPr lang="it-IT"/>
           </a:p>
@@ -1485,7 +1485,7 @@
           <a:p>
             <a:fld id="{4459AEA4-8903-45F8-8472-1F4F976680A3}" type="slidenum">
               <a:rPr lang="it-IT" smtClean="0"/>
-              <a:t>‹N›</a:t>
+              <a:t>‹#›</a:t>
             </a:fld>
             <a:endParaRPr lang="it-IT"/>
           </a:p>
@@ -1843,7 +1843,7 @@
           <a:p>
             <a:fld id="{C513A26C-1484-4743-BBFB-ED973AB48944}" type="datetimeFigureOut">
               <a:rPr lang="it-IT" smtClean="0"/>
-              <a:t>04/11/2020</a:t>
+              <a:t>05/11/20</a:t>
             </a:fld>
             <a:endParaRPr lang="it-IT"/>
           </a:p>
@@ -1897,7 +1897,7 @@
           <a:p>
             <a:fld id="{4459AEA4-8903-45F8-8472-1F4F976680A3}" type="slidenum">
               <a:rPr lang="it-IT" smtClean="0"/>
-              <a:t>‹N›</a:t>
+              <a:t>‹#›</a:t>
             </a:fld>
             <a:endParaRPr lang="it-IT"/>
           </a:p>
@@ -1984,7 +1984,7 @@
           <a:p>
             <a:fld id="{C513A26C-1484-4743-BBFB-ED973AB48944}" type="datetimeFigureOut">
               <a:rPr lang="it-IT" smtClean="0"/>
-              <a:t>04/11/2020</a:t>
+              <a:t>05/11/20</a:t>
             </a:fld>
             <a:endParaRPr lang="it-IT"/>
           </a:p>
@@ -2038,7 +2038,7 @@
           <a:p>
             <a:fld id="{4459AEA4-8903-45F8-8472-1F4F976680A3}" type="slidenum">
               <a:rPr lang="it-IT" smtClean="0"/>
-              <a:t>‹N›</a:t>
+              <a:t>‹#›</a:t>
             </a:fld>
             <a:endParaRPr lang="it-IT"/>
           </a:p>
@@ -2097,7 +2097,7 @@
           <a:p>
             <a:fld id="{C513A26C-1484-4743-BBFB-ED973AB48944}" type="datetimeFigureOut">
               <a:rPr lang="it-IT" smtClean="0"/>
-              <a:t>04/11/2020</a:t>
+              <a:t>05/11/20</a:t>
             </a:fld>
             <a:endParaRPr lang="it-IT"/>
           </a:p>
@@ -2151,7 +2151,7 @@
           <a:p>
             <a:fld id="{4459AEA4-8903-45F8-8472-1F4F976680A3}" type="slidenum">
               <a:rPr lang="it-IT" smtClean="0"/>
-              <a:t>‹N›</a:t>
+              <a:t>‹#›</a:t>
             </a:fld>
             <a:endParaRPr lang="it-IT"/>
           </a:p>
@@ -2408,7 +2408,7 @@
           <a:p>
             <a:fld id="{C513A26C-1484-4743-BBFB-ED973AB48944}" type="datetimeFigureOut">
               <a:rPr lang="it-IT" smtClean="0"/>
-              <a:t>04/11/2020</a:t>
+              <a:t>05/11/20</a:t>
             </a:fld>
             <a:endParaRPr lang="it-IT"/>
           </a:p>
@@ -2462,7 +2462,7 @@
           <a:p>
             <a:fld id="{4459AEA4-8903-45F8-8472-1F4F976680A3}" type="slidenum">
               <a:rPr lang="it-IT" smtClean="0"/>
-              <a:t>‹N›</a:t>
+              <a:t>‹#›</a:t>
             </a:fld>
             <a:endParaRPr lang="it-IT"/>
           </a:p>
@@ -2696,7 +2696,7 @@
           <a:p>
             <a:fld id="{C513A26C-1484-4743-BBFB-ED973AB48944}" type="datetimeFigureOut">
               <a:rPr lang="it-IT" smtClean="0"/>
-              <a:t>04/11/2020</a:t>
+              <a:t>05/11/20</a:t>
             </a:fld>
             <a:endParaRPr lang="it-IT"/>
           </a:p>
@@ -2750,7 +2750,7 @@
           <a:p>
             <a:fld id="{4459AEA4-8903-45F8-8472-1F4F976680A3}" type="slidenum">
               <a:rPr lang="it-IT" smtClean="0"/>
-              <a:t>‹N›</a:t>
+              <a:t>‹#›</a:t>
             </a:fld>
             <a:endParaRPr lang="it-IT"/>
           </a:p>
@@ -2937,7 +2937,7 @@
           <a:p>
             <a:fld id="{C513A26C-1484-4743-BBFB-ED973AB48944}" type="datetimeFigureOut">
               <a:rPr lang="it-IT" smtClean="0"/>
-              <a:t>04/11/2020</a:t>
+              <a:t>05/11/20</a:t>
             </a:fld>
             <a:endParaRPr lang="it-IT"/>
           </a:p>
@@ -3027,7 +3027,7 @@
           <a:p>
             <a:fld id="{4459AEA4-8903-45F8-8472-1F4F976680A3}" type="slidenum">
               <a:rPr lang="it-IT" smtClean="0"/>
-              <a:t>‹N›</a:t>
+              <a:t>‹#›</a:t>
             </a:fld>
             <a:endParaRPr lang="it-IT"/>
           </a:p>
@@ -3340,6 +3340,14 @@
 <file path=ppt/slides/slide1.xml><?xml version="1.0" encoding="utf-8"?>
 <p:sld xmlns:a="http://schemas.openxmlformats.org/drawingml/2006/main" xmlns:r="http://schemas.openxmlformats.org/officeDocument/2006/relationships" xmlns:p="http://schemas.openxmlformats.org/presentationml/2006/main">
   <p:cSld>
+    <p:bg>
+      <p:bgPr>
+        <a:solidFill>
+          <a:schemeClr val="bg1"/>
+        </a:solidFill>
+        <a:effectLst/>
+      </p:bgPr>
+    </p:bg>
     <p:spTree>
       <p:nvGrpSpPr>
         <p:cNvPr id="1" name=""/>
@@ -3356,6 +3364,115 @@
       </p:grpSpPr>
       <p:sp>
         <p:nvSpPr>
+          <p:cNvPr id="135" name="Rectangle 134">
+            <a:extLst>
+              <a:ext uri="{FF2B5EF4-FFF2-40B4-BE49-F238E27FC236}">
+                <a16:creationId xmlns:a16="http://schemas.microsoft.com/office/drawing/2014/main" id="{E20EB187-900F-4AF5-813B-101456D9FD39}"/>
+              </a:ext>
+              <a:ext uri="{C183D7F6-B498-43B3-948B-1728B52AA6E4}">
+                <adec:decorative xmlns:adec="http://schemas.microsoft.com/office/drawing/2017/decorative" val="1"/>
+              </a:ext>
+            </a:extLst>
+          </p:cNvPr>
+          <p:cNvSpPr>
+            <a:spLocks noGrp="1" noRot="1" noChangeAspect="1" noMove="1" noResize="1" noEditPoints="1" noAdjustHandles="1" noChangeArrowheads="1" noChangeShapeType="1" noTextEdit="1"/>
+          </p:cNvSpPr>
+          <p:nvPr>
+            <p:extLst>
+              <p:ext uri="{386F3935-93C4-4BCD-93E2-E3B085C9AB24}">
+                <p16:designElem xmlns:p16="http://schemas.microsoft.com/office/powerpoint/2015/main" val="1"/>
+              </p:ext>
+            </p:extLst>
+          </p:nvPr>
+        </p:nvSpPr>
+        <p:spPr>
+          <a:xfrm>
+            <a:off x="0" y="0"/>
+            <a:ext cx="12192000" cy="6858000"/>
+          </a:xfrm>
+          <a:prstGeom prst="rect">
+            <a:avLst/>
+          </a:prstGeom>
+          <a:solidFill>
+            <a:srgbClr val="000000"/>
+          </a:solidFill>
+          <a:ln>
+            <a:noFill/>
+          </a:ln>
+        </p:spPr>
+        <p:style>
+          <a:lnRef idx="2">
+            <a:schemeClr val="accent1">
+              <a:shade val="50000"/>
+            </a:schemeClr>
+          </a:lnRef>
+          <a:fillRef idx="1">
+            <a:schemeClr val="accent1"/>
+          </a:fillRef>
+          <a:effectRef idx="0">
+            <a:schemeClr val="accent1"/>
+          </a:effectRef>
+          <a:fontRef idx="minor">
+            <a:schemeClr val="lt1"/>
+          </a:fontRef>
+        </p:style>
+        <p:txBody>
+          <a:bodyPr rtlCol="0" anchor="ctr"/>
+          <a:lstStyle/>
+          <a:p>
+            <a:pPr algn="ctr"/>
+            <a:endParaRPr lang="en-US"/>
+          </a:p>
+        </p:txBody>
+      </p:sp>
+      <p:pic>
+        <p:nvPicPr>
+          <p:cNvPr id="1026" name="Picture 2" descr="Premium Photo | Healthy lifestyle, food and sport concept on pink pastel  background.">
+            <a:extLst>
+              <a:ext uri="{FF2B5EF4-FFF2-40B4-BE49-F238E27FC236}">
+                <a16:creationId xmlns:a16="http://schemas.microsoft.com/office/drawing/2014/main" id="{333D7DB9-294B-934F-B30C-463863C201EF}"/>
+              </a:ext>
+            </a:extLst>
+          </p:cNvPr>
+          <p:cNvPicPr>
+            <a:picLocks noChangeAspect="1" noChangeArrowheads="1"/>
+          </p:cNvPicPr>
+          <p:nvPr/>
+        </p:nvPicPr>
+        <p:blipFill rotWithShape="1">
+          <a:blip r:embed="rId2">
+            <a:alphaModFix amt="50000"/>
+            <a:extLst>
+              <a:ext uri="{28A0092B-C50C-407E-A947-70E740481C1C}">
+                <a14:useLocalDpi xmlns:a14="http://schemas.microsoft.com/office/drawing/2010/main" val="0"/>
+              </a:ext>
+            </a:extLst>
+          </a:blip>
+          <a:srcRect b="15414"/>
+          <a:stretch/>
+        </p:blipFill>
+        <p:spPr bwMode="auto">
+          <a:xfrm>
+            <a:off x="20" y="1"/>
+            <a:ext cx="12191980" cy="6857999"/>
+          </a:xfrm>
+          <a:prstGeom prst="rect">
+            <a:avLst/>
+          </a:prstGeom>
+          <a:noFill/>
+          <a:extLst>
+            <a:ext uri="{909E8E84-426E-40DD-AFC4-6F175D3DCCD1}">
+              <a14:hiddenFill xmlns:a14="http://schemas.microsoft.com/office/drawing/2010/main">
+                <a:solidFill>
+                  <a:srgbClr val="FFFFFF"/>
+                </a:solidFill>
+              </a14:hiddenFill>
+            </a:ext>
+          </a:extLst>
+        </p:spPr>
+      </p:pic>
+      <p:sp>
+        <p:nvSpPr>
           <p:cNvPr id="2" name="Titolo 1">
             <a:extLst>
               <a:ext uri="{FF2B5EF4-FFF2-40B4-BE49-F238E27FC236}">
@@ -3370,17 +3487,51 @@
             <p:ph type="ctrTitle"/>
           </p:nvPr>
         </p:nvSpPr>
-        <p:spPr/>
-        <p:txBody>
-          <a:bodyPr>
+        <p:spPr>
+          <a:xfrm>
+            <a:off x="4387349" y="1200152"/>
+            <a:ext cx="6897171" cy="4457696"/>
+          </a:xfrm>
+        </p:spPr>
+        <p:txBody>
+          <a:bodyPr anchor="ctr">
             <a:normAutofit/>
           </a:bodyPr>
           <a:lstStyle/>
           <a:p>
-            <a:r>
-              <a:rPr lang="it-IT" sz="7200" dirty="0"/>
+            <a:pPr algn="l"/>
+            <a:r>
+              <a:rPr lang="it-IT" sz="7400" dirty="0">
+                <a:solidFill>
+                  <a:srgbClr val="FFFFFF"/>
+                </a:solidFill>
+              </a:rPr>
               <a:t>FAO</a:t>
             </a:r>
+            <a:br>
+              <a:rPr lang="it-IT" sz="7400" dirty="0">
+                <a:solidFill>
+                  <a:srgbClr val="FFFFFF"/>
+                </a:solidFill>
+              </a:rPr>
+            </a:br>
+            <a:r>
+              <a:rPr lang="it-IT" sz="3200" b="1" dirty="0">
+                <a:solidFill>
+                  <a:schemeClr val="tx1">
+                    <a:lumMod val="75000"/>
+                  </a:schemeClr>
+                </a:solidFill>
+              </a:rPr>
+              <a:t>THE APP THAT MAKES YOU EAT HEALTHY</a:t>
+            </a:r>
+            <a:endParaRPr lang="it-IT" sz="7400" b="1" dirty="0">
+              <a:solidFill>
+                <a:schemeClr val="tx1">
+                  <a:lumMod val="75000"/>
+                </a:schemeClr>
+              </a:solidFill>
+            </a:endParaRPr>
           </a:p>
         </p:txBody>
       </p:sp>
@@ -3400,44 +3551,82 @@
             <p:ph type="subTitle" idx="1"/>
           </p:nvPr>
         </p:nvSpPr>
-        <p:spPr/>
-        <p:txBody>
-          <a:bodyPr>
+        <p:spPr>
+          <a:xfrm>
+            <a:off x="849963" y="1200152"/>
+            <a:ext cx="2816535" cy="4457696"/>
+          </a:xfrm>
+        </p:spPr>
+        <p:txBody>
+          <a:bodyPr anchor="ctr">
             <a:normAutofit/>
           </a:bodyPr>
           <a:lstStyle/>
           <a:p>
-            <a:pPr marL="457200" indent="-457200" algn="l">
-              <a:buFont typeface="Arial" panose="020B0604020202020204" pitchFamily="34" charset="0"/>
-              <a:buChar char="•"/>
-            </a:pPr>
-            <a:r>
-              <a:rPr lang="it-IT" sz="2800" dirty="0"/>
-              <a:t>Felici Rocco</a:t>
-            </a:r>
-          </a:p>
-          <a:p>
-            <a:pPr marL="457200" indent="-457200" algn="l">
-              <a:buFont typeface="Arial" panose="020B0604020202020204" pitchFamily="34" charset="0"/>
-              <a:buChar char="•"/>
-            </a:pPr>
-            <a:r>
-              <a:rPr lang="it-IT" sz="2800" dirty="0"/>
-              <a:t>Silva Edoardo</a:t>
-            </a:r>
-          </a:p>
-          <a:p>
-            <a:pPr marL="457200" indent="-457200" algn="l">
-              <a:buFont typeface="Arial" panose="020B0604020202020204" pitchFamily="34" charset="0"/>
-              <a:buChar char="•"/>
-            </a:pPr>
-            <a:r>
-              <a:rPr lang="it-IT" sz="2800" dirty="0"/>
-              <a:t>Vitali Tommaso </a:t>
-            </a:r>
-          </a:p>
-        </p:txBody>
-      </p:sp>
+            <a:pPr algn="r"/>
+            <a:r>
+              <a:rPr lang="it-IT" sz="2800" dirty="0">
+                <a:solidFill>
+                  <a:srgbClr val="FFFFFF"/>
+                </a:solidFill>
+              </a:rPr>
+              <a:t>Felici Rocco                        Silva Edoardo              Vitali Tommaso </a:t>
+            </a:r>
+          </a:p>
+        </p:txBody>
+      </p:sp>
+      <p:cxnSp>
+        <p:nvCxnSpPr>
+          <p:cNvPr id="137" name="Straight Connector 136">
+            <a:extLst>
+              <a:ext uri="{FF2B5EF4-FFF2-40B4-BE49-F238E27FC236}">
+                <a16:creationId xmlns:a16="http://schemas.microsoft.com/office/drawing/2014/main" id="{624D17C8-E9C2-48A4-AA36-D7048A6CCC41}"/>
+              </a:ext>
+              <a:ext uri="{C183D7F6-B498-43B3-948B-1728B52AA6E4}">
+                <adec:decorative xmlns:adec="http://schemas.microsoft.com/office/drawing/2017/decorative" val="1"/>
+              </a:ext>
+            </a:extLst>
+          </p:cNvPr>
+          <p:cNvCxnSpPr>
+            <a:cxnSpLocks noGrp="1" noRot="1" noChangeAspect="1" noMove="1" noResize="1" noEditPoints="1" noAdjustHandles="1" noChangeArrowheads="1" noChangeShapeType="1"/>
+          </p:cNvCxnSpPr>
+          <p:nvPr>
+            <p:extLst>
+              <p:ext uri="{386F3935-93C4-4BCD-93E2-E3B085C9AB24}">
+                <p16:designElem xmlns:p16="http://schemas.microsoft.com/office/powerpoint/2015/main" val="1"/>
+              </p:ext>
+            </p:extLst>
+          </p:nvPr>
+        </p:nvCxnSpPr>
+        <p:spPr>
+          <a:xfrm>
+            <a:off x="4055891" y="2286000"/>
+            <a:ext cx="0" cy="2286000"/>
+          </a:xfrm>
+          <a:prstGeom prst="line">
+            <a:avLst/>
+          </a:prstGeom>
+          <a:ln w="19050">
+            <a:solidFill>
+              <a:srgbClr val="FFFFFF"/>
+            </a:solidFill>
+          </a:ln>
+        </p:spPr>
+        <p:style>
+          <a:lnRef idx="1">
+            <a:schemeClr val="accent1"/>
+          </a:lnRef>
+          <a:fillRef idx="0">
+            <a:schemeClr val="accent1"/>
+          </a:fillRef>
+          <a:effectRef idx="0">
+            <a:schemeClr val="accent1"/>
+          </a:effectRef>
+          <a:fontRef idx="minor">
+            <a:schemeClr val="tx1"/>
+          </a:fontRef>
+        </p:style>
+      </p:cxnSp>
     </p:spTree>
     <p:extLst>
       <p:ext uri="{BB962C8B-B14F-4D97-AF65-F5344CB8AC3E}">
@@ -3446,7 +3635,7 @@
     </p:extLst>
   </p:cSld>
   <p:clrMapOvr>
-    <a:masterClrMapping/>
+    <a:overrideClrMapping bg1="dk1" tx1="lt1" bg2="dk2" tx2="lt2" accent1="accent1" accent2="accent2" accent3="accent3" accent4="accent4" accent5="accent5" accent6="accent6" hlink="hlink" folHlink="folHlink"/>
   </p:clrMapOvr>
 </p:sld>
 </file>
@@ -3454,6 +3643,17 @@
 <file path=ppt/slides/slide2.xml><?xml version="1.0" encoding="utf-8"?>
 <p:sld xmlns:a="http://schemas.openxmlformats.org/drawingml/2006/main" xmlns:r="http://schemas.openxmlformats.org/officeDocument/2006/relationships" xmlns:p="http://schemas.openxmlformats.org/presentationml/2006/main">
   <p:cSld>
+    <p:bg>
+      <p:bgPr>
+        <a:solidFill>
+          <a:schemeClr val="bg1">
+            <a:tint val="95000"/>
+            <a:satMod val="170000"/>
+          </a:schemeClr>
+        </a:solidFill>
+        <a:effectLst/>
+      </p:bgPr>
+    </p:bg>
     <p:spTree>
       <p:nvGrpSpPr>
         <p:cNvPr id="1" name=""/>
@@ -3484,112 +3684,783 @@
             <p:ph type="title"/>
           </p:nvPr>
         </p:nvSpPr>
-        <p:spPr/>
-        <p:txBody>
-          <a:bodyPr/>
-          <a:lstStyle/>
-          <a:p>
-            <a:r>
-              <a:rPr lang="it-IT" dirty="0" err="1"/>
-              <a:t>Motivation</a:t>
-            </a:r>
-            <a:r>
-              <a:rPr lang="it-IT" dirty="0"/>
-              <a:t> slide</a:t>
-            </a:r>
-          </a:p>
-        </p:txBody>
-      </p:sp>
-      <p:sp>
-        <p:nvSpPr>
-          <p:cNvPr id="3" name="Segnaposto contenuto 2">
-            <a:extLst>
-              <a:ext uri="{FF2B5EF4-FFF2-40B4-BE49-F238E27FC236}">
-                <a16:creationId xmlns:a16="http://schemas.microsoft.com/office/drawing/2014/main" id="{7F9BC9ED-CD0B-4C49-BFE8-DF7340CC516F}"/>
-              </a:ext>
-            </a:extLst>
-          </p:cNvPr>
-          <p:cNvSpPr>
-            <a:spLocks noGrp="1"/>
-          </p:cNvSpPr>
-          <p:nvPr>
-            <p:ph idx="1"/>
-          </p:nvPr>
-        </p:nvSpPr>
         <p:spPr>
           <a:xfrm>
-            <a:off x="838200" y="1509205"/>
-            <a:ext cx="10515600" cy="1919796"/>
+            <a:off x="801098" y="1396289"/>
+            <a:ext cx="6387102" cy="1325563"/>
           </a:xfrm>
         </p:spPr>
         <p:txBody>
-          <a:bodyPr/>
+          <a:bodyPr>
+            <a:normAutofit/>
+          </a:bodyPr>
           <a:lstStyle/>
           <a:p>
             <a:r>
-              <a:rPr lang="en-US" dirty="0"/>
-              <a:t>This app will help people to have a correct diet and eat the proper foods that supply their needs based on the calories burnt during the day, accounting what food they have at their </a:t>
-            </a:r>
-            <a:r>
-              <a:rPr lang="it-IT" dirty="0" err="1"/>
-              <a:t>disposal</a:t>
-            </a:r>
-            <a:r>
               <a:rPr lang="it-IT" dirty="0"/>
-              <a:t>.</a:t>
-            </a:r>
-          </a:p>
-        </p:txBody>
-      </p:sp>
-      <p:sp>
-        <p:nvSpPr>
-          <p:cNvPr id="4" name="CasellaDiTesto 3">
-            <a:extLst>
-              <a:ext uri="{FF2B5EF4-FFF2-40B4-BE49-F238E27FC236}">
-                <a16:creationId xmlns:a16="http://schemas.microsoft.com/office/drawing/2014/main" id="{5B29A6B0-EE98-4F88-84E9-549068B3D305}"/>
-              </a:ext>
-            </a:extLst>
-          </p:cNvPr>
-          <p:cNvSpPr txBox="1"/>
-          <p:nvPr/>
+              <a:t>MOTIVATION</a:t>
+            </a:r>
+          </a:p>
+        </p:txBody>
+      </p:sp>
+      <p:sp>
+        <p:nvSpPr>
+          <p:cNvPr id="2052" name="Freeform: Shape 70">
+            <a:extLst>
+              <a:ext uri="{FF2B5EF4-FFF2-40B4-BE49-F238E27FC236}">
+                <a16:creationId xmlns:a16="http://schemas.microsoft.com/office/drawing/2014/main" id="{2C6A2225-94AF-4BC4-98F4-77746E7B10A9}"/>
+              </a:ext>
+              <a:ext uri="{C183D7F6-B498-43B3-948B-1728B52AA6E4}">
+                <adec:decorative xmlns:adec="http://schemas.microsoft.com/office/drawing/2017/decorative" val="1"/>
+              </a:ext>
+            </a:extLst>
+          </p:cNvPr>
+          <p:cNvSpPr>
+            <a:spLocks noGrp="1" noRot="1" noChangeAspect="1" noMove="1" noResize="1" noEditPoints="1" noAdjustHandles="1" noChangeArrowheads="1" noChangeShapeType="1" noTextEdit="1"/>
+          </p:cNvSpPr>
+          <p:nvPr>
+            <p:extLst>
+              <p:ext uri="{386F3935-93C4-4BCD-93E2-E3B085C9AB24}">
+                <p16:designElem xmlns:p16="http://schemas.microsoft.com/office/powerpoint/2015/main" val="1"/>
+              </p:ext>
+            </p:extLst>
+          </p:nvPr>
         </p:nvSpPr>
         <p:spPr>
           <a:xfrm>
-            <a:off x="838200" y="3595456"/>
-            <a:ext cx="10515600" cy="2677656"/>
+            <a:off x="7525108" y="1"/>
+            <a:ext cx="4666892" cy="3612937"/>
+          </a:xfrm>
+          <a:custGeom>
+            <a:avLst/>
+            <a:gdLst>
+              <a:gd name="connsiteX0" fmla="*/ 192227 w 4666892"/>
+              <a:gd name="connsiteY0" fmla="*/ 0 h 3612937"/>
+              <a:gd name="connsiteX1" fmla="*/ 4666892 w 4666892"/>
+              <a:gd name="connsiteY1" fmla="*/ 0 h 3612937"/>
+              <a:gd name="connsiteX2" fmla="*/ 4666892 w 4666892"/>
+              <a:gd name="connsiteY2" fmla="*/ 2643684 h 3612937"/>
+              <a:gd name="connsiteX3" fmla="*/ 4657487 w 4666892"/>
+              <a:gd name="connsiteY3" fmla="*/ 2656262 h 3612937"/>
+              <a:gd name="connsiteX4" fmla="*/ 2628900 w 4666892"/>
+              <a:gd name="connsiteY4" fmla="*/ 3612937 h 3612937"/>
+              <a:gd name="connsiteX5" fmla="*/ 0 w 4666892"/>
+              <a:gd name="connsiteY5" fmla="*/ 984037 h 3612937"/>
+              <a:gd name="connsiteX6" fmla="*/ 118190 w 4666892"/>
+              <a:gd name="connsiteY6" fmla="*/ 202283 h 3612937"/>
+            </a:gdLst>
+            <a:ahLst/>
+            <a:cxnLst>
+              <a:cxn ang="0">
+                <a:pos x="connsiteX0" y="connsiteY0"/>
+              </a:cxn>
+              <a:cxn ang="0">
+                <a:pos x="connsiteX1" y="connsiteY1"/>
+              </a:cxn>
+              <a:cxn ang="0">
+                <a:pos x="connsiteX2" y="connsiteY2"/>
+              </a:cxn>
+              <a:cxn ang="0">
+                <a:pos x="connsiteX3" y="connsiteY3"/>
+              </a:cxn>
+              <a:cxn ang="0">
+                <a:pos x="connsiteX4" y="connsiteY4"/>
+              </a:cxn>
+              <a:cxn ang="0">
+                <a:pos x="connsiteX5" y="connsiteY5"/>
+              </a:cxn>
+              <a:cxn ang="0">
+                <a:pos x="connsiteX6" y="connsiteY6"/>
+              </a:cxn>
+            </a:cxnLst>
+            <a:rect l="l" t="t" r="r" b="b"/>
+            <a:pathLst>
+              <a:path w="4666892" h="3612937">
+                <a:moveTo>
+                  <a:pt x="192227" y="0"/>
+                </a:moveTo>
+                <a:lnTo>
+                  <a:pt x="4666892" y="0"/>
+                </a:lnTo>
+                <a:lnTo>
+                  <a:pt x="4666892" y="2643684"/>
+                </a:lnTo>
+                <a:lnTo>
+                  <a:pt x="4657487" y="2656262"/>
+                </a:lnTo>
+                <a:cubicBezTo>
+                  <a:pt x="4175308" y="3240527"/>
+                  <a:pt x="3445594" y="3612937"/>
+                  <a:pt x="2628900" y="3612937"/>
+                </a:cubicBezTo>
+                <a:cubicBezTo>
+                  <a:pt x="1176999" y="3612937"/>
+                  <a:pt x="0" y="2435938"/>
+                  <a:pt x="0" y="984037"/>
+                </a:cubicBezTo>
+                <a:cubicBezTo>
+                  <a:pt x="0" y="711806"/>
+                  <a:pt x="41379" y="449239"/>
+                  <a:pt x="118190" y="202283"/>
+                </a:cubicBezTo>
+                <a:close/>
+              </a:path>
+            </a:pathLst>
+          </a:custGeom>
+          <a:solidFill>
+            <a:srgbClr val="FFFFFF">
+              <a:alpha val="80000"/>
+            </a:srgbClr>
+          </a:solidFill>
+          <a:ln>
+            <a:noFill/>
+          </a:ln>
+        </p:spPr>
+        <p:style>
+          <a:lnRef idx="2">
+            <a:schemeClr val="accent1">
+              <a:shade val="50000"/>
+            </a:schemeClr>
+          </a:lnRef>
+          <a:fillRef idx="1">
+            <a:schemeClr val="accent1"/>
+          </a:fillRef>
+          <a:effectRef idx="0">
+            <a:schemeClr val="accent1"/>
+          </a:effectRef>
+          <a:fontRef idx="minor">
+            <a:schemeClr val="lt1"/>
+          </a:fontRef>
+        </p:style>
+        <p:txBody>
+          <a:bodyPr rtlCol="0" anchor="ctr"/>
+          <a:lstStyle/>
+          <a:p>
+            <a:pPr marL="0" marR="0" lvl="0" indent="0" algn="ctr" defTabSz="914400" rtl="0" eaLnBrk="1" fontAlgn="auto" latinLnBrk="0" hangingPunct="1">
+              <a:lnSpc>
+                <a:spcPct val="100000"/>
+              </a:lnSpc>
+              <a:spcBef>
+                <a:spcPts val="0"/>
+              </a:spcBef>
+              <a:spcAft>
+                <a:spcPts val="0"/>
+              </a:spcAft>
+              <a:buClrTx/>
+              <a:buSzTx/>
+              <a:buFontTx/>
+              <a:buNone/>
+              <a:tabLst/>
+              <a:defRPr/>
+            </a:pPr>
+            <a:endParaRPr kumimoji="0" lang="en-US" sz="1800" b="0" i="0" u="none" strike="noStrike" kern="1200" cap="none" spc="0" normalizeH="0" baseline="0" noProof="0">
+              <a:ln>
+                <a:noFill/>
+              </a:ln>
+              <a:solidFill>
+                <a:prstClr val="white"/>
+              </a:solidFill>
+              <a:effectLst/>
+              <a:uLnTx/>
+              <a:uFillTx/>
+              <a:latin typeface="Calibri" panose="020F0502020204030204"/>
+              <a:ea typeface="+mn-ea"/>
+              <a:cs typeface="+mn-cs"/>
+            </a:endParaRPr>
+          </a:p>
+        </p:txBody>
+      </p:sp>
+      <p:pic>
+        <p:nvPicPr>
+          <p:cNvPr id="8" name="Picture 2" descr="6 Weird Perks and Health Benefits of Being a Long-Distance Runner">
+            <a:extLst>
+              <a:ext uri="{FF2B5EF4-FFF2-40B4-BE49-F238E27FC236}">
+                <a16:creationId xmlns:a16="http://schemas.microsoft.com/office/drawing/2014/main" id="{6F1B6D99-53F0-3A41-AFE3-F9A09524ECE4}"/>
+              </a:ext>
+            </a:extLst>
+          </p:cNvPr>
+          <p:cNvPicPr>
+            <a:picLocks noChangeAspect="1" noChangeArrowheads="1"/>
+          </p:cNvPicPr>
+          <p:nvPr/>
+        </p:nvPicPr>
+        <p:blipFill rotWithShape="1">
+          <a:blip r:embed="rId2">
+            <a:extLst>
+              <a:ext uri="{28A0092B-C50C-407E-A947-70E740481C1C}">
+                <a14:useLocalDpi xmlns:a14="http://schemas.microsoft.com/office/drawing/2010/main" val="0"/>
+              </a:ext>
+            </a:extLst>
+          </a:blip>
+          <a:srcRect r="2076"/>
+          <a:stretch/>
+        </p:blipFill>
+        <p:spPr bwMode="auto">
+          <a:xfrm>
+            <a:off x="7689829" y="10"/>
+            <a:ext cx="4502173" cy="3448209"/>
+          </a:xfrm>
+          <a:custGeom>
+            <a:avLst/>
+            <a:gdLst/>
+            <a:ahLst/>
+            <a:cxnLst/>
+            <a:rect l="l" t="t" r="r" b="b"/>
+            <a:pathLst>
+              <a:path w="4502173" h="3448219">
+                <a:moveTo>
+                  <a:pt x="205627" y="0"/>
+                </a:moveTo>
+                <a:lnTo>
+                  <a:pt x="4502173" y="0"/>
+                </a:lnTo>
+                <a:lnTo>
+                  <a:pt x="4502173" y="2368934"/>
+                </a:lnTo>
+                <a:lnTo>
+                  <a:pt x="4365663" y="2551486"/>
+                </a:lnTo>
+                <a:cubicBezTo>
+                  <a:pt x="3913696" y="3099144"/>
+                  <a:pt x="3229704" y="3448219"/>
+                  <a:pt x="2464181" y="3448219"/>
+                </a:cubicBezTo>
+                <a:cubicBezTo>
+                  <a:pt x="1103251" y="3448219"/>
+                  <a:pt x="0" y="2344968"/>
+                  <a:pt x="0" y="984038"/>
+                </a:cubicBezTo>
+                <a:cubicBezTo>
+                  <a:pt x="0" y="643806"/>
+                  <a:pt x="68954" y="319678"/>
+                  <a:pt x="193648" y="24867"/>
+                </a:cubicBezTo>
+                <a:close/>
+              </a:path>
+            </a:pathLst>
+          </a:custGeom>
+          <a:noFill/>
+          <a:extLst>
+            <a:ext uri="{909E8E84-426E-40DD-AFC4-6F175D3DCCD1}">
+              <a14:hiddenFill xmlns:a14="http://schemas.microsoft.com/office/drawing/2010/main">
+                <a:solidFill>
+                  <a:srgbClr val="FFFFFF"/>
+                </a:solidFill>
+              </a14:hiddenFill>
+            </a:ext>
+          </a:extLst>
+        </p:spPr>
+      </p:pic>
+      <p:sp>
+        <p:nvSpPr>
+          <p:cNvPr id="2053" name="Freeform: Shape 72">
+            <a:extLst>
+              <a:ext uri="{FF2B5EF4-FFF2-40B4-BE49-F238E27FC236}">
+                <a16:creationId xmlns:a16="http://schemas.microsoft.com/office/drawing/2014/main" id="{648F5915-2CE1-4F74-88C5-D4366893D2DF}"/>
+              </a:ext>
+              <a:ext uri="{C183D7F6-B498-43B3-948B-1728B52AA6E4}">
+                <adec:decorative xmlns:adec="http://schemas.microsoft.com/office/drawing/2017/decorative" val="1"/>
+              </a:ext>
+            </a:extLst>
+          </p:cNvPr>
+          <p:cNvSpPr>
+            <a:spLocks noGrp="1" noRot="1" noChangeAspect="1" noMove="1" noResize="1" noEditPoints="1" noAdjustHandles="1" noChangeArrowheads="1" noChangeShapeType="1" noTextEdit="1"/>
+          </p:cNvSpPr>
+          <p:nvPr>
+            <p:extLst>
+              <p:ext uri="{386F3935-93C4-4BCD-93E2-E3B085C9AB24}">
+                <p16:designElem xmlns:p16="http://schemas.microsoft.com/office/powerpoint/2015/main" val="1"/>
+              </p:ext>
+            </p:extLst>
+          </p:nvPr>
+        </p:nvSpPr>
+        <p:spPr>
+          <a:xfrm>
+            <a:off x="8604737" y="3918051"/>
+            <a:ext cx="3587263" cy="2939948"/>
+          </a:xfrm>
+          <a:custGeom>
+            <a:avLst/>
+            <a:gdLst>
+              <a:gd name="connsiteX0" fmla="*/ 2070613 w 3587263"/>
+              <a:gd name="connsiteY0" fmla="*/ 0 h 2939948"/>
+              <a:gd name="connsiteX1" fmla="*/ 3534758 w 3587263"/>
+              <a:gd name="connsiteY1" fmla="*/ 606469 h 2939948"/>
+              <a:gd name="connsiteX2" fmla="*/ 3587263 w 3587263"/>
+              <a:gd name="connsiteY2" fmla="*/ 664240 h 2939948"/>
+              <a:gd name="connsiteX3" fmla="*/ 3587263 w 3587263"/>
+              <a:gd name="connsiteY3" fmla="*/ 2939948 h 2939948"/>
+              <a:gd name="connsiteX4" fmla="*/ 193241 w 3587263"/>
+              <a:gd name="connsiteY4" fmla="*/ 2939948 h 2939948"/>
+              <a:gd name="connsiteX5" fmla="*/ 162719 w 3587263"/>
+              <a:gd name="connsiteY5" fmla="*/ 2876589 h 2939948"/>
+              <a:gd name="connsiteX6" fmla="*/ 0 w 3587263"/>
+              <a:gd name="connsiteY6" fmla="*/ 2070613 h 2939948"/>
+              <a:gd name="connsiteX7" fmla="*/ 2070613 w 3587263"/>
+              <a:gd name="connsiteY7" fmla="*/ 0 h 2939948"/>
+            </a:gdLst>
+            <a:ahLst/>
+            <a:cxnLst>
+              <a:cxn ang="0">
+                <a:pos x="connsiteX0" y="connsiteY0"/>
+              </a:cxn>
+              <a:cxn ang="0">
+                <a:pos x="connsiteX1" y="connsiteY1"/>
+              </a:cxn>
+              <a:cxn ang="0">
+                <a:pos x="connsiteX2" y="connsiteY2"/>
+              </a:cxn>
+              <a:cxn ang="0">
+                <a:pos x="connsiteX3" y="connsiteY3"/>
+              </a:cxn>
+              <a:cxn ang="0">
+                <a:pos x="connsiteX4" y="connsiteY4"/>
+              </a:cxn>
+              <a:cxn ang="0">
+                <a:pos x="connsiteX5" y="connsiteY5"/>
+              </a:cxn>
+              <a:cxn ang="0">
+                <a:pos x="connsiteX6" y="connsiteY6"/>
+              </a:cxn>
+              <a:cxn ang="0">
+                <a:pos x="connsiteX7" y="connsiteY7"/>
+              </a:cxn>
+            </a:cxnLst>
+            <a:rect l="l" t="t" r="r" b="b"/>
+            <a:pathLst>
+              <a:path w="3587263" h="2939948">
+                <a:moveTo>
+                  <a:pt x="2070613" y="0"/>
+                </a:moveTo>
+                <a:cubicBezTo>
+                  <a:pt x="2642397" y="0"/>
+                  <a:pt x="3160050" y="231761"/>
+                  <a:pt x="3534758" y="606469"/>
+                </a:cubicBezTo>
+                <a:lnTo>
+                  <a:pt x="3587263" y="664240"/>
+                </a:lnTo>
+                <a:lnTo>
+                  <a:pt x="3587263" y="2939948"/>
+                </a:lnTo>
+                <a:lnTo>
+                  <a:pt x="193241" y="2939948"/>
+                </a:lnTo>
+                <a:lnTo>
+                  <a:pt x="162719" y="2876589"/>
+                </a:lnTo>
+                <a:cubicBezTo>
+                  <a:pt x="57940" y="2628865"/>
+                  <a:pt x="0" y="2356505"/>
+                  <a:pt x="0" y="2070613"/>
+                </a:cubicBezTo>
+                <a:cubicBezTo>
+                  <a:pt x="0" y="927045"/>
+                  <a:pt x="927045" y="0"/>
+                  <a:pt x="2070613" y="0"/>
+                </a:cubicBezTo>
+                <a:close/>
+              </a:path>
+            </a:pathLst>
+          </a:custGeom>
+          <a:solidFill>
+            <a:srgbClr val="FFFFFF">
+              <a:alpha val="80000"/>
+            </a:srgbClr>
+          </a:solidFill>
+          <a:ln>
+            <a:noFill/>
+          </a:ln>
+        </p:spPr>
+        <p:style>
+          <a:lnRef idx="2">
+            <a:schemeClr val="accent1">
+              <a:shade val="50000"/>
+            </a:schemeClr>
+          </a:lnRef>
+          <a:fillRef idx="1">
+            <a:schemeClr val="accent1"/>
+          </a:fillRef>
+          <a:effectRef idx="0">
+            <a:schemeClr val="accent1"/>
+          </a:effectRef>
+          <a:fontRef idx="minor">
+            <a:schemeClr val="lt1"/>
+          </a:fontRef>
+        </p:style>
+        <p:txBody>
+          <a:bodyPr rtlCol="0" anchor="ctr"/>
+          <a:lstStyle/>
+          <a:p>
+            <a:pPr marL="0" marR="0" lvl="0" indent="0" algn="ctr" defTabSz="914400" rtl="0" eaLnBrk="1" fontAlgn="auto" latinLnBrk="0" hangingPunct="1">
+              <a:lnSpc>
+                <a:spcPct val="100000"/>
+              </a:lnSpc>
+              <a:spcBef>
+                <a:spcPts val="0"/>
+              </a:spcBef>
+              <a:spcAft>
+                <a:spcPts val="0"/>
+              </a:spcAft>
+              <a:buClrTx/>
+              <a:buSzTx/>
+              <a:buFontTx/>
+              <a:buNone/>
+              <a:tabLst/>
+              <a:defRPr/>
+            </a:pPr>
+            <a:endParaRPr kumimoji="0" lang="en-US" sz="1800" b="0" i="0" u="none" strike="noStrike" kern="1200" cap="none" spc="0" normalizeH="0" baseline="0" noProof="0">
+              <a:ln>
+                <a:noFill/>
+              </a:ln>
+              <a:solidFill>
+                <a:prstClr val="white"/>
+              </a:solidFill>
+              <a:effectLst/>
+              <a:uLnTx/>
+              <a:uFillTx/>
+              <a:latin typeface="Calibri" panose="020F0502020204030204"/>
+              <a:ea typeface="+mn-ea"/>
+              <a:cs typeface="+mn-cs"/>
+            </a:endParaRPr>
+          </a:p>
+        </p:txBody>
+      </p:sp>
+      <p:pic>
+        <p:nvPicPr>
+          <p:cNvPr id="2050" name="Picture 2">
+            <a:extLst>
+              <a:ext uri="{FF2B5EF4-FFF2-40B4-BE49-F238E27FC236}">
+                <a16:creationId xmlns:a16="http://schemas.microsoft.com/office/drawing/2014/main" id="{C8FECCA5-D40F-624B-91E6-86B22269F712}"/>
+              </a:ext>
+            </a:extLst>
+          </p:cNvPr>
+          <p:cNvPicPr>
+            <a:picLocks noChangeAspect="1" noChangeArrowheads="1"/>
+          </p:cNvPicPr>
+          <p:nvPr/>
+        </p:nvPicPr>
+        <p:blipFill>
+          <a:blip r:embed="rId3">
+            <a:extLst>
+              <a:ext uri="{28A0092B-C50C-407E-A947-70E740481C1C}">
+                <a14:useLocalDpi xmlns:a14="http://schemas.microsoft.com/office/drawing/2010/main" val="0"/>
+              </a:ext>
+            </a:extLst>
+          </a:blip>
+          <a:srcRect l="8673" r="8673"/>
+          <a:stretch/>
+        </p:blipFill>
+        <p:spPr bwMode="auto">
+          <a:xfrm>
+            <a:off x="8768827" y="4082141"/>
+            <a:ext cx="3423175" cy="2775859"/>
+          </a:xfrm>
+          <a:custGeom>
+            <a:avLst/>
+            <a:gdLst/>
+            <a:ahLst/>
+            <a:cxnLst/>
+            <a:rect l="l" t="t" r="r" b="b"/>
+            <a:pathLst>
+              <a:path w="3423175" h="2775859">
+                <a:moveTo>
+                  <a:pt x="1906524" y="0"/>
+                </a:moveTo>
+                <a:cubicBezTo>
+                  <a:pt x="2498805" y="0"/>
+                  <a:pt x="3028006" y="270078"/>
+                  <a:pt x="3377691" y="693798"/>
+                </a:cubicBezTo>
+                <a:lnTo>
+                  <a:pt x="3423175" y="754624"/>
+                </a:lnTo>
+                <a:lnTo>
+                  <a:pt x="3423175" y="2775859"/>
+                </a:lnTo>
+                <a:lnTo>
+                  <a:pt x="211114" y="2775859"/>
+                </a:lnTo>
+                <a:lnTo>
+                  <a:pt x="149824" y="2648629"/>
+                </a:lnTo>
+                <a:cubicBezTo>
+                  <a:pt x="53349" y="2420536"/>
+                  <a:pt x="0" y="2169760"/>
+                  <a:pt x="0" y="1906524"/>
+                </a:cubicBezTo>
+                <a:cubicBezTo>
+                  <a:pt x="0" y="853580"/>
+                  <a:pt x="853580" y="0"/>
+                  <a:pt x="1906524" y="0"/>
+                </a:cubicBezTo>
+                <a:close/>
+              </a:path>
+            </a:pathLst>
+          </a:custGeom>
+          <a:noFill/>
+          <a:extLst>
+            <a:ext uri="{909E8E84-426E-40DD-AFC4-6F175D3DCCD1}">
+              <a14:hiddenFill xmlns:a14="http://schemas.microsoft.com/office/drawing/2010/main">
+                <a:solidFill>
+                  <a:srgbClr val="FFFFFF"/>
+                </a:solidFill>
+              </a14:hiddenFill>
+            </a:ext>
+          </a:extLst>
+        </p:spPr>
+      </p:pic>
+      <p:sp>
+        <p:nvSpPr>
+          <p:cNvPr id="6" name="Segnaposto contenuto 2">
+            <a:extLst>
+              <a:ext uri="{FF2B5EF4-FFF2-40B4-BE49-F238E27FC236}">
+                <a16:creationId xmlns:a16="http://schemas.microsoft.com/office/drawing/2014/main" id="{2854E57E-3B88-8E4C-ABEF-C525561FAD89}"/>
+              </a:ext>
+            </a:extLst>
+          </p:cNvPr>
+          <p:cNvSpPr txBox="1">
+            <a:spLocks/>
+          </p:cNvSpPr>
+          <p:nvPr/>
+        </p:nvSpPr>
+        <p:spPr>
+          <a:xfrm>
+            <a:off x="801098" y="2721852"/>
+            <a:ext cx="7259690" cy="3988437"/>
           </a:xfrm>
           <a:prstGeom prst="rect">
             <a:avLst/>
           </a:prstGeom>
-          <a:noFill/>
         </p:spPr>
         <p:txBody>
-          <a:bodyPr wrap="square" rtlCol="0">
-            <a:spAutoFit/>
+          <a:bodyPr vert="horz" lIns="91440" tIns="45720" rIns="91440" bIns="45720" rtlCol="0">
+            <a:normAutofit/>
           </a:bodyPr>
-          <a:lstStyle/>
-          <a:p>
-            <a:pPr marL="457200" indent="-457200">
+          <a:lstStyle>
+            <a:lvl1pPr marL="228600" indent="-228600" algn="l" defTabSz="914400" rtl="0" eaLnBrk="1" latinLnBrk="0" hangingPunct="1">
+              <a:lnSpc>
+                <a:spcPct val="90000"/>
+              </a:lnSpc>
+              <a:spcBef>
+                <a:spcPts val="1000"/>
+              </a:spcBef>
               <a:buFont typeface="Arial" panose="020B0604020202020204" pitchFamily="34" charset="0"/>
               <a:buChar char="•"/>
-            </a:pPr>
-            <a:r>
-              <a:rPr lang="en-US" sz="2800" dirty="0"/>
-              <a:t>Ensuring and granting a correct personalized diet can prevent bad habits, and recipes based of what the user inputs prevent them from searching for the it themselves.</a:t>
-            </a:r>
-          </a:p>
-          <a:p>
-            <a:pPr marL="457200" indent="-457200">
+              <a:defRPr sz="2800" kern="1200">
+                <a:solidFill>
+                  <a:schemeClr val="tx1"/>
+                </a:solidFill>
+                <a:latin typeface="+mn-lt"/>
+                <a:ea typeface="+mn-ea"/>
+                <a:cs typeface="+mn-cs"/>
+              </a:defRPr>
+            </a:lvl1pPr>
+            <a:lvl2pPr marL="685800" indent="-228600" algn="l" defTabSz="914400" rtl="0" eaLnBrk="1" latinLnBrk="0" hangingPunct="1">
+              <a:lnSpc>
+                <a:spcPct val="90000"/>
+              </a:lnSpc>
+              <a:spcBef>
+                <a:spcPts val="500"/>
+              </a:spcBef>
               <a:buFont typeface="Arial" panose="020B0604020202020204" pitchFamily="34" charset="0"/>
               <a:buChar char="•"/>
+              <a:defRPr sz="2400" kern="1200">
+                <a:solidFill>
+                  <a:schemeClr val="tx1"/>
+                </a:solidFill>
+                <a:latin typeface="+mn-lt"/>
+                <a:ea typeface="+mn-ea"/>
+                <a:cs typeface="+mn-cs"/>
+              </a:defRPr>
+            </a:lvl2pPr>
+            <a:lvl3pPr marL="1143000" indent="-228600" algn="l" defTabSz="914400" rtl="0" eaLnBrk="1" latinLnBrk="0" hangingPunct="1">
+              <a:lnSpc>
+                <a:spcPct val="90000"/>
+              </a:lnSpc>
+              <a:spcBef>
+                <a:spcPts val="500"/>
+              </a:spcBef>
+              <a:buFont typeface="Arial" panose="020B0604020202020204" pitchFamily="34" charset="0"/>
+              <a:buChar char="•"/>
+              <a:defRPr sz="2000" kern="1200">
+                <a:solidFill>
+                  <a:schemeClr val="tx1"/>
+                </a:solidFill>
+                <a:latin typeface="+mn-lt"/>
+                <a:ea typeface="+mn-ea"/>
+                <a:cs typeface="+mn-cs"/>
+              </a:defRPr>
+            </a:lvl3pPr>
+            <a:lvl4pPr marL="1600200" indent="-228600" algn="l" defTabSz="914400" rtl="0" eaLnBrk="1" latinLnBrk="0" hangingPunct="1">
+              <a:lnSpc>
+                <a:spcPct val="90000"/>
+              </a:lnSpc>
+              <a:spcBef>
+                <a:spcPts val="500"/>
+              </a:spcBef>
+              <a:buFont typeface="Arial" panose="020B0604020202020204" pitchFamily="34" charset="0"/>
+              <a:buChar char="•"/>
+              <a:defRPr sz="1800" kern="1200">
+                <a:solidFill>
+                  <a:schemeClr val="tx1"/>
+                </a:solidFill>
+                <a:latin typeface="+mn-lt"/>
+                <a:ea typeface="+mn-ea"/>
+                <a:cs typeface="+mn-cs"/>
+              </a:defRPr>
+            </a:lvl4pPr>
+            <a:lvl5pPr marL="2057400" indent="-228600" algn="l" defTabSz="914400" rtl="0" eaLnBrk="1" latinLnBrk="0" hangingPunct="1">
+              <a:lnSpc>
+                <a:spcPct val="90000"/>
+              </a:lnSpc>
+              <a:spcBef>
+                <a:spcPts val="500"/>
+              </a:spcBef>
+              <a:buFont typeface="Arial" panose="020B0604020202020204" pitchFamily="34" charset="0"/>
+              <a:buChar char="•"/>
+              <a:defRPr sz="1800" kern="1200">
+                <a:solidFill>
+                  <a:schemeClr val="tx1"/>
+                </a:solidFill>
+                <a:latin typeface="+mn-lt"/>
+                <a:ea typeface="+mn-ea"/>
+                <a:cs typeface="+mn-cs"/>
+              </a:defRPr>
+            </a:lvl5pPr>
+            <a:lvl6pPr marL="2514600" indent="-228600" algn="l" defTabSz="914400" rtl="0" eaLnBrk="1" latinLnBrk="0" hangingPunct="1">
+              <a:lnSpc>
+                <a:spcPct val="90000"/>
+              </a:lnSpc>
+              <a:spcBef>
+                <a:spcPts val="500"/>
+              </a:spcBef>
+              <a:buFont typeface="Arial" panose="020B0604020202020204" pitchFamily="34" charset="0"/>
+              <a:buChar char="•"/>
+              <a:defRPr sz="1800" kern="1200">
+                <a:solidFill>
+                  <a:schemeClr val="tx1"/>
+                </a:solidFill>
+                <a:latin typeface="+mn-lt"/>
+                <a:ea typeface="+mn-ea"/>
+                <a:cs typeface="+mn-cs"/>
+              </a:defRPr>
+            </a:lvl6pPr>
+            <a:lvl7pPr marL="2971800" indent="-228600" algn="l" defTabSz="914400" rtl="0" eaLnBrk="1" latinLnBrk="0" hangingPunct="1">
+              <a:lnSpc>
+                <a:spcPct val="90000"/>
+              </a:lnSpc>
+              <a:spcBef>
+                <a:spcPts val="500"/>
+              </a:spcBef>
+              <a:buFont typeface="Arial" panose="020B0604020202020204" pitchFamily="34" charset="0"/>
+              <a:buChar char="•"/>
+              <a:defRPr sz="1800" kern="1200">
+                <a:solidFill>
+                  <a:schemeClr val="tx1"/>
+                </a:solidFill>
+                <a:latin typeface="+mn-lt"/>
+                <a:ea typeface="+mn-ea"/>
+                <a:cs typeface="+mn-cs"/>
+              </a:defRPr>
+            </a:lvl7pPr>
+            <a:lvl8pPr marL="3429000" indent="-228600" algn="l" defTabSz="914400" rtl="0" eaLnBrk="1" latinLnBrk="0" hangingPunct="1">
+              <a:lnSpc>
+                <a:spcPct val="90000"/>
+              </a:lnSpc>
+              <a:spcBef>
+                <a:spcPts val="500"/>
+              </a:spcBef>
+              <a:buFont typeface="Arial" panose="020B0604020202020204" pitchFamily="34" charset="0"/>
+              <a:buChar char="•"/>
+              <a:defRPr sz="1800" kern="1200">
+                <a:solidFill>
+                  <a:schemeClr val="tx1"/>
+                </a:solidFill>
+                <a:latin typeface="+mn-lt"/>
+                <a:ea typeface="+mn-ea"/>
+                <a:cs typeface="+mn-cs"/>
+              </a:defRPr>
+            </a:lvl8pPr>
+            <a:lvl9pPr marL="3886200" indent="-228600" algn="l" defTabSz="914400" rtl="0" eaLnBrk="1" latinLnBrk="0" hangingPunct="1">
+              <a:lnSpc>
+                <a:spcPct val="90000"/>
+              </a:lnSpc>
+              <a:spcBef>
+                <a:spcPts val="500"/>
+              </a:spcBef>
+              <a:buFont typeface="Arial" panose="020B0604020202020204" pitchFamily="34" charset="0"/>
+              <a:buChar char="•"/>
+              <a:defRPr sz="1800" kern="1200">
+                <a:solidFill>
+                  <a:schemeClr val="tx1"/>
+                </a:solidFill>
+                <a:latin typeface="+mn-lt"/>
+                <a:ea typeface="+mn-ea"/>
+                <a:cs typeface="+mn-cs"/>
+              </a:defRPr>
+            </a:lvl9pPr>
+          </a:lstStyle>
+          <a:p>
+            <a:pPr marL="0" indent="0" algn="just">
+              <a:buNone/>
             </a:pPr>
             <a:r>
-              <a:rPr lang="en-US" sz="2800" dirty="0"/>
-              <a:t>This app aim to have easier and more precise inputs than existing solutions, plus the main activity a human does everyday is walking.</a:t>
-            </a:r>
-          </a:p>
-          <a:p>
-            <a:endParaRPr lang="it-IT" sz="2800" dirty="0"/>
+              <a:rPr lang="en-US" dirty="0"/>
+              <a:t>Too lazy to search for a tasty and – at the same time – healthy recipe, using the ingredients you have at home? Healthy for who?</a:t>
+            </a:r>
+          </a:p>
+          <a:p>
+            <a:pPr marL="0" indent="0" algn="just">
+              <a:buNone/>
+            </a:pPr>
+            <a:endParaRPr lang="en-US" dirty="0"/>
+          </a:p>
+          <a:p>
+            <a:pPr marL="0" indent="0" algn="just">
+              <a:buNone/>
+            </a:pPr>
+            <a:r>
+              <a:rPr lang="en-US" dirty="0"/>
+              <a:t>This app will try to help people having a correct diet and </a:t>
+            </a:r>
+            <a:r>
+              <a:rPr lang="en-US" u="sng" dirty="0"/>
+              <a:t>eat the proper foods</a:t>
+            </a:r>
+            <a:r>
+              <a:rPr lang="en-US" dirty="0"/>
+              <a:t> that supply their needs </a:t>
+            </a:r>
+            <a:r>
+              <a:rPr lang="en-US" u="sng" dirty="0"/>
+              <a:t>based on the calories burnt</a:t>
+            </a:r>
+            <a:r>
+              <a:rPr lang="en-US" dirty="0"/>
+              <a:t> during the day, accounting </a:t>
+            </a:r>
+            <a:r>
+              <a:rPr lang="en-US" u="sng" dirty="0"/>
+              <a:t>what food they have at their disposal</a:t>
+            </a:r>
+            <a:r>
+              <a:rPr lang="it-IT" dirty="0"/>
+              <a:t>.</a:t>
+            </a:r>
+          </a:p>
+          <a:p>
+            <a:pPr marL="0" indent="0" algn="just">
+              <a:buNone/>
+            </a:pPr>
+            <a:endParaRPr lang="it-IT" dirty="0"/>
+          </a:p>
+          <a:p>
+            <a:pPr marL="0" indent="0">
+              <a:buFont typeface="Arial" panose="020B0604020202020204" pitchFamily="34" charset="0"/>
+              <a:buNone/>
+            </a:pPr>
+            <a:endParaRPr lang="it-IT" dirty="0"/>
           </a:p>
         </p:txBody>
       </p:sp>
@@ -3601,7 +4472,7 @@
     </p:extLst>
   </p:cSld>
   <p:clrMapOvr>
-    <a:masterClrMapping/>
+    <a:overrideClrMapping bg1="dk1" tx1="lt1" bg2="dk2" tx2="lt2" accent1="accent1" accent2="accent2" accent3="accent3" accent4="accent4" accent5="accent5" accent6="accent6" hlink="hlink" folHlink="folHlink"/>
   </p:clrMapOvr>
 </p:sld>
 </file>
@@ -3609,6 +4480,14 @@
 <file path=ppt/slides/slide3.xml><?xml version="1.0" encoding="utf-8"?>
 <p:sld xmlns:a="http://schemas.openxmlformats.org/drawingml/2006/main" xmlns:r="http://schemas.openxmlformats.org/officeDocument/2006/relationships" xmlns:p="http://schemas.openxmlformats.org/presentationml/2006/main">
   <p:cSld>
+    <p:bg>
+      <p:bgPr>
+        <a:solidFill>
+          <a:srgbClr val="3F3F3F"/>
+        </a:solidFill>
+        <a:effectLst/>
+      </p:bgPr>
+    </p:bg>
     <p:spTree>
       <p:nvGrpSpPr>
         <p:cNvPr id="1" name=""/>
@@ -3623,162 +4502,942 @@
           <a:chExt cx="0" cy="0"/>
         </a:xfrm>
       </p:grpSpPr>
-      <p:sp>
-        <p:nvSpPr>
-          <p:cNvPr id="2" name="Titolo 1">
-            <a:extLst>
-              <a:ext uri="{FF2B5EF4-FFF2-40B4-BE49-F238E27FC236}">
-                <a16:creationId xmlns:a16="http://schemas.microsoft.com/office/drawing/2014/main" id="{68DAD65B-7125-4151-AFE3-2C670FAC8DF5}"/>
-              </a:ext>
-            </a:extLst>
-          </p:cNvPr>
-          <p:cNvSpPr>
-            <a:spLocks noGrp="1"/>
-          </p:cNvSpPr>
-          <p:nvPr>
-            <p:ph type="title"/>
-          </p:nvPr>
-        </p:nvSpPr>
-        <p:spPr/>
-        <p:txBody>
-          <a:bodyPr/>
-          <a:lstStyle/>
-          <a:p>
-            <a:r>
-              <a:rPr lang="en-US" dirty="0"/>
-              <a:t>Implementation</a:t>
-            </a:r>
-            <a:endParaRPr lang="it-IT" dirty="0"/>
-          </a:p>
-        </p:txBody>
-      </p:sp>
-      <p:sp>
-        <p:nvSpPr>
-          <p:cNvPr id="3" name="Segnaposto contenuto 2">
-            <a:extLst>
-              <a:ext uri="{FF2B5EF4-FFF2-40B4-BE49-F238E27FC236}">
-                <a16:creationId xmlns:a16="http://schemas.microsoft.com/office/drawing/2014/main" id="{D3871264-FF9D-42E5-B46D-E2B7D6B273E2}"/>
-              </a:ext>
-            </a:extLst>
-          </p:cNvPr>
-          <p:cNvSpPr>
-            <a:spLocks noGrp="1"/>
-          </p:cNvSpPr>
-          <p:nvPr>
-            <p:ph idx="1"/>
+      <p:sp useBgFill="1">
+        <p:nvSpPr>
+          <p:cNvPr id="4106" name="Rectangle 74">
+            <a:extLst>
+              <a:ext uri="{FF2B5EF4-FFF2-40B4-BE49-F238E27FC236}">
+                <a16:creationId xmlns:a16="http://schemas.microsoft.com/office/drawing/2014/main" id="{53B475F8-50AE-46A0-9943-B2B63183D50C}"/>
+              </a:ext>
+              <a:ext uri="{C183D7F6-B498-43B3-948B-1728B52AA6E4}">
+                <adec:decorative xmlns:adec="http://schemas.microsoft.com/office/drawing/2017/decorative" val="1"/>
+              </a:ext>
+            </a:extLst>
+          </p:cNvPr>
+          <p:cNvSpPr>
+            <a:spLocks noGrp="1" noRot="1" noChangeAspect="1" noMove="1" noResize="1" noEditPoints="1" noAdjustHandles="1" noChangeArrowheads="1" noChangeShapeType="1" noTextEdit="1"/>
+          </p:cNvSpPr>
+          <p:nvPr>
+            <p:extLst>
+              <p:ext uri="{386F3935-93C4-4BCD-93E2-E3B085C9AB24}">
+                <p16:designElem xmlns:p16="http://schemas.microsoft.com/office/powerpoint/2015/main" val="1"/>
+              </p:ext>
+            </p:extLst>
           </p:nvPr>
         </p:nvSpPr>
         <p:spPr>
           <a:xfrm>
-            <a:off x="838200" y="1544715"/>
-            <a:ext cx="10515600" cy="4632248"/>
+            <a:off x="0" y="0"/>
+            <a:ext cx="12188952" cy="6858000"/>
+          </a:xfrm>
+          <a:prstGeom prst="rect">
+            <a:avLst/>
+          </a:prstGeom>
+          <a:ln>
+            <a:noFill/>
+          </a:ln>
+        </p:spPr>
+        <p:style>
+          <a:lnRef idx="2">
+            <a:schemeClr val="accent1">
+              <a:shade val="50000"/>
+            </a:schemeClr>
+          </a:lnRef>
+          <a:fillRef idx="1">
+            <a:schemeClr val="accent1"/>
+          </a:fillRef>
+          <a:effectRef idx="0">
+            <a:schemeClr val="accent1"/>
+          </a:effectRef>
+          <a:fontRef idx="minor">
+            <a:schemeClr val="lt1"/>
+          </a:fontRef>
+        </p:style>
+        <p:txBody>
+          <a:bodyPr rtlCol="0" anchor="ctr"/>
+          <a:lstStyle/>
+          <a:p>
+            <a:pPr algn="ctr"/>
+            <a:endParaRPr lang="en-US"/>
+          </a:p>
+        </p:txBody>
+      </p:sp>
+      <p:sp>
+        <p:nvSpPr>
+          <p:cNvPr id="2" name="Titolo 1">
+            <a:extLst>
+              <a:ext uri="{FF2B5EF4-FFF2-40B4-BE49-F238E27FC236}">
+                <a16:creationId xmlns:a16="http://schemas.microsoft.com/office/drawing/2014/main" id="{68DAD65B-7125-4151-AFE3-2C670FAC8DF5}"/>
+              </a:ext>
+            </a:extLst>
+          </p:cNvPr>
+          <p:cNvSpPr>
+            <a:spLocks noGrp="1"/>
+          </p:cNvSpPr>
+          <p:nvPr>
+            <p:ph type="title"/>
+          </p:nvPr>
+        </p:nvSpPr>
+        <p:spPr>
+          <a:xfrm>
+            <a:off x="612648" y="365125"/>
+            <a:ext cx="6986015" cy="1776484"/>
           </a:xfrm>
         </p:spPr>
         <p:txBody>
-          <a:bodyPr>
-            <a:normAutofit fontScale="92500" lnSpcReduction="10000"/>
+          <a:bodyPr anchor="b">
+            <a:normAutofit/>
           </a:bodyPr>
           <a:lstStyle/>
           <a:p>
             <a:r>
-              <a:rPr lang="it-IT" dirty="0"/>
-              <a:t>Pages are </a:t>
-            </a:r>
-            <a:r>
-              <a:rPr lang="it-IT" dirty="0" err="1"/>
+              <a:rPr lang="en-US" sz="5400" dirty="0">
+                <a:solidFill>
+                  <a:schemeClr val="bg1"/>
+                </a:solidFill>
+              </a:rPr>
+              <a:t>IMPLEMENTATION</a:t>
+            </a:r>
+            <a:endParaRPr lang="it-IT" sz="5400" dirty="0">
+              <a:solidFill>
+                <a:schemeClr val="bg1"/>
+              </a:solidFill>
+            </a:endParaRPr>
+          </a:p>
+        </p:txBody>
+      </p:sp>
+      <p:pic>
+        <p:nvPicPr>
+          <p:cNvPr id="4102" name="Picture 6" descr="Running Man. Male Runner Jogging At The Park. Guy Training Outdo - Medal  Awards Rack">
+            <a:extLst>
+              <a:ext uri="{FF2B5EF4-FFF2-40B4-BE49-F238E27FC236}">
+                <a16:creationId xmlns:a16="http://schemas.microsoft.com/office/drawing/2014/main" id="{27103070-BEB0-0A4B-BA2C-54383390A3FE}"/>
+              </a:ext>
+            </a:extLst>
+          </p:cNvPr>
+          <p:cNvPicPr>
+            <a:picLocks noChangeAspect="1" noChangeArrowheads="1"/>
+          </p:cNvPicPr>
+          <p:nvPr/>
+        </p:nvPicPr>
+        <p:blipFill>
+          <a:blip r:embed="rId2">
+            <a:extLst>
+              <a:ext uri="{28A0092B-C50C-407E-A947-70E740481C1C}">
+                <a14:useLocalDpi xmlns:a14="http://schemas.microsoft.com/office/drawing/2010/main" val="0"/>
+              </a:ext>
+            </a:extLst>
+          </a:blip>
+          <a:stretch>
+            <a:fillRect/>
+          </a:stretch>
+        </p:blipFill>
+        <p:spPr bwMode="auto">
+          <a:xfrm>
+            <a:off x="8722372" y="4358181"/>
+            <a:ext cx="2831790" cy="1890220"/>
+          </a:xfrm>
+          <a:prstGeom prst="rect">
+            <a:avLst/>
+          </a:prstGeom>
+          <a:noFill/>
+          <a:extLst>
+            <a:ext uri="{909E8E84-426E-40DD-AFC4-6F175D3DCCD1}">
+              <a14:hiddenFill xmlns:a14="http://schemas.microsoft.com/office/drawing/2010/main">
+                <a:solidFill>
+                  <a:srgbClr val="FFFFFF"/>
+                </a:solidFill>
+              </a14:hiddenFill>
+            </a:ext>
+          </a:extLst>
+        </p:spPr>
+      </p:pic>
+      <p:sp>
+        <p:nvSpPr>
+          <p:cNvPr id="4107" name="sketch line">
+            <a:extLst>
+              <a:ext uri="{FF2B5EF4-FFF2-40B4-BE49-F238E27FC236}">
+                <a16:creationId xmlns:a16="http://schemas.microsoft.com/office/drawing/2014/main" id="{75F6FDB4-2351-48C2-A863-2364A02343C0}"/>
+              </a:ext>
+              <a:ext uri="{C183D7F6-B498-43B3-948B-1728B52AA6E4}">
+                <adec:decorative xmlns:adec="http://schemas.microsoft.com/office/drawing/2017/decorative" val="1"/>
+              </a:ext>
+            </a:extLst>
+          </p:cNvPr>
+          <p:cNvSpPr>
+            <a:spLocks noGrp="1" noRot="1" noChangeAspect="1" noMove="1" noResize="1" noEditPoints="1" noAdjustHandles="1" noChangeArrowheads="1" noChangeShapeType="1" noTextEdit="1"/>
+          </p:cNvSpPr>
+          <p:nvPr>
+            <p:extLst>
+              <p:ext uri="{386F3935-93C4-4BCD-93E2-E3B085C9AB24}">
+                <p16:designElem xmlns:p16="http://schemas.microsoft.com/office/powerpoint/2015/main" val="1"/>
+              </p:ext>
+            </p:extLst>
+          </p:nvPr>
+        </p:nvSpPr>
+        <p:spPr>
+          <a:xfrm>
+            <a:off x="838200" y="2315691"/>
+            <a:ext cx="4343400" cy="18288"/>
+          </a:xfrm>
+          <a:custGeom>
+            <a:avLst/>
+            <a:gdLst>
+              <a:gd name="connsiteX0" fmla="*/ 0 w 4343400"/>
+              <a:gd name="connsiteY0" fmla="*/ 0 h 18288"/>
+              <a:gd name="connsiteX1" fmla="*/ 577052 w 4343400"/>
+              <a:gd name="connsiteY1" fmla="*/ 0 h 18288"/>
+              <a:gd name="connsiteX2" fmla="*/ 1067235 w 4343400"/>
+              <a:gd name="connsiteY2" fmla="*/ 0 h 18288"/>
+              <a:gd name="connsiteX3" fmla="*/ 1600853 w 4343400"/>
+              <a:gd name="connsiteY3" fmla="*/ 0 h 18288"/>
+              <a:gd name="connsiteX4" fmla="*/ 2264773 w 4343400"/>
+              <a:gd name="connsiteY4" fmla="*/ 0 h 18288"/>
+              <a:gd name="connsiteX5" fmla="*/ 2841825 w 4343400"/>
+              <a:gd name="connsiteY5" fmla="*/ 0 h 18288"/>
+              <a:gd name="connsiteX6" fmla="*/ 3375442 w 4343400"/>
+              <a:gd name="connsiteY6" fmla="*/ 0 h 18288"/>
+              <a:gd name="connsiteX7" fmla="*/ 4343400 w 4343400"/>
+              <a:gd name="connsiteY7" fmla="*/ 0 h 18288"/>
+              <a:gd name="connsiteX8" fmla="*/ 4343400 w 4343400"/>
+              <a:gd name="connsiteY8" fmla="*/ 18288 h 18288"/>
+              <a:gd name="connsiteX9" fmla="*/ 3722914 w 4343400"/>
+              <a:gd name="connsiteY9" fmla="*/ 18288 h 18288"/>
+              <a:gd name="connsiteX10" fmla="*/ 3189297 w 4343400"/>
+              <a:gd name="connsiteY10" fmla="*/ 18288 h 18288"/>
+              <a:gd name="connsiteX11" fmla="*/ 2481943 w 4343400"/>
+              <a:gd name="connsiteY11" fmla="*/ 18288 h 18288"/>
+              <a:gd name="connsiteX12" fmla="*/ 1904891 w 4343400"/>
+              <a:gd name="connsiteY12" fmla="*/ 18288 h 18288"/>
+              <a:gd name="connsiteX13" fmla="*/ 1414707 w 4343400"/>
+              <a:gd name="connsiteY13" fmla="*/ 18288 h 18288"/>
+              <a:gd name="connsiteX14" fmla="*/ 750788 w 4343400"/>
+              <a:gd name="connsiteY14" fmla="*/ 18288 h 18288"/>
+              <a:gd name="connsiteX15" fmla="*/ 0 w 4343400"/>
+              <a:gd name="connsiteY15" fmla="*/ 18288 h 18288"/>
+              <a:gd name="connsiteX16" fmla="*/ 0 w 4343400"/>
+              <a:gd name="connsiteY16" fmla="*/ 0 h 18288"/>
+            </a:gdLst>
+            <a:ahLst/>
+            <a:cxnLst>
+              <a:cxn ang="0">
+                <a:pos x="connsiteX0" y="connsiteY0"/>
+              </a:cxn>
+              <a:cxn ang="0">
+                <a:pos x="connsiteX1" y="connsiteY1"/>
+              </a:cxn>
+              <a:cxn ang="0">
+                <a:pos x="connsiteX2" y="connsiteY2"/>
+              </a:cxn>
+              <a:cxn ang="0">
+                <a:pos x="connsiteX3" y="connsiteY3"/>
+              </a:cxn>
+              <a:cxn ang="0">
+                <a:pos x="connsiteX4" y="connsiteY4"/>
+              </a:cxn>
+              <a:cxn ang="0">
+                <a:pos x="connsiteX5" y="connsiteY5"/>
+              </a:cxn>
+              <a:cxn ang="0">
+                <a:pos x="connsiteX6" y="connsiteY6"/>
+              </a:cxn>
+              <a:cxn ang="0">
+                <a:pos x="connsiteX7" y="connsiteY7"/>
+              </a:cxn>
+              <a:cxn ang="0">
+                <a:pos x="connsiteX8" y="connsiteY8"/>
+              </a:cxn>
+              <a:cxn ang="0">
+                <a:pos x="connsiteX9" y="connsiteY9"/>
+              </a:cxn>
+              <a:cxn ang="0">
+                <a:pos x="connsiteX10" y="connsiteY10"/>
+              </a:cxn>
+              <a:cxn ang="0">
+                <a:pos x="connsiteX11" y="connsiteY11"/>
+              </a:cxn>
+              <a:cxn ang="0">
+                <a:pos x="connsiteX12" y="connsiteY12"/>
+              </a:cxn>
+              <a:cxn ang="0">
+                <a:pos x="connsiteX13" y="connsiteY13"/>
+              </a:cxn>
+              <a:cxn ang="0">
+                <a:pos x="connsiteX14" y="connsiteY14"/>
+              </a:cxn>
+              <a:cxn ang="0">
+                <a:pos x="connsiteX15" y="connsiteY15"/>
+              </a:cxn>
+              <a:cxn ang="0">
+                <a:pos x="connsiteX16" y="connsiteY16"/>
+              </a:cxn>
+            </a:cxnLst>
+            <a:rect l="l" t="t" r="r" b="b"/>
+            <a:pathLst>
+              <a:path w="4343400" h="18288" fill="none" extrusionOk="0">
+                <a:moveTo>
+                  <a:pt x="0" y="0"/>
+                </a:moveTo>
+                <a:cubicBezTo>
+                  <a:pt x="233209" y="-19550"/>
+                  <a:pt x="330816" y="19068"/>
+                  <a:pt x="577052" y="0"/>
+                </a:cubicBezTo>
+                <a:cubicBezTo>
+                  <a:pt x="823288" y="-19068"/>
+                  <a:pt x="875077" y="10360"/>
+                  <a:pt x="1067235" y="0"/>
+                </a:cubicBezTo>
+                <a:cubicBezTo>
+                  <a:pt x="1259393" y="-10360"/>
+                  <a:pt x="1410699" y="2939"/>
+                  <a:pt x="1600853" y="0"/>
+                </a:cubicBezTo>
+                <a:cubicBezTo>
+                  <a:pt x="1791007" y="-2939"/>
+                  <a:pt x="2101644" y="-26225"/>
+                  <a:pt x="2264773" y="0"/>
+                </a:cubicBezTo>
+                <a:cubicBezTo>
+                  <a:pt x="2427902" y="26225"/>
+                  <a:pt x="2690426" y="-27726"/>
+                  <a:pt x="2841825" y="0"/>
+                </a:cubicBezTo>
+                <a:cubicBezTo>
+                  <a:pt x="2993224" y="27726"/>
+                  <a:pt x="3172320" y="-18569"/>
+                  <a:pt x="3375442" y="0"/>
+                </a:cubicBezTo>
+                <a:cubicBezTo>
+                  <a:pt x="3578564" y="18569"/>
+                  <a:pt x="4003119" y="21909"/>
+                  <a:pt x="4343400" y="0"/>
+                </a:cubicBezTo>
+                <a:cubicBezTo>
+                  <a:pt x="4343798" y="7429"/>
+                  <a:pt x="4343380" y="10822"/>
+                  <a:pt x="4343400" y="18288"/>
+                </a:cubicBezTo>
+                <a:cubicBezTo>
+                  <a:pt x="4109047" y="14709"/>
+                  <a:pt x="3996986" y="7919"/>
+                  <a:pt x="3722914" y="18288"/>
+                </a:cubicBezTo>
+                <a:cubicBezTo>
+                  <a:pt x="3448842" y="28657"/>
+                  <a:pt x="3340973" y="29252"/>
+                  <a:pt x="3189297" y="18288"/>
+                </a:cubicBezTo>
+                <a:cubicBezTo>
+                  <a:pt x="3037621" y="7324"/>
+                  <a:pt x="2636891" y="-9539"/>
+                  <a:pt x="2481943" y="18288"/>
+                </a:cubicBezTo>
+                <a:cubicBezTo>
+                  <a:pt x="2326995" y="46115"/>
+                  <a:pt x="2131632" y="740"/>
+                  <a:pt x="1904891" y="18288"/>
+                </a:cubicBezTo>
+                <a:cubicBezTo>
+                  <a:pt x="1678150" y="35836"/>
+                  <a:pt x="1575362" y="-3381"/>
+                  <a:pt x="1414707" y="18288"/>
+                </a:cubicBezTo>
+                <a:cubicBezTo>
+                  <a:pt x="1254052" y="39957"/>
+                  <a:pt x="1051093" y="-335"/>
+                  <a:pt x="750788" y="18288"/>
+                </a:cubicBezTo>
+                <a:cubicBezTo>
+                  <a:pt x="450483" y="36911"/>
+                  <a:pt x="293781" y="22900"/>
+                  <a:pt x="0" y="18288"/>
+                </a:cubicBezTo>
+                <a:cubicBezTo>
+                  <a:pt x="-591" y="13205"/>
+                  <a:pt x="-663" y="6329"/>
+                  <a:pt x="0" y="0"/>
+                </a:cubicBezTo>
+                <a:close/>
+              </a:path>
+              <a:path w="4343400" h="18288" stroke="0" extrusionOk="0">
+                <a:moveTo>
+                  <a:pt x="0" y="0"/>
+                </a:moveTo>
+                <a:cubicBezTo>
+                  <a:pt x="212719" y="-28531"/>
+                  <a:pt x="340561" y="-1164"/>
+                  <a:pt x="577052" y="0"/>
+                </a:cubicBezTo>
+                <a:cubicBezTo>
+                  <a:pt x="813543" y="1164"/>
+                  <a:pt x="866967" y="-9376"/>
+                  <a:pt x="1067235" y="0"/>
+                </a:cubicBezTo>
+                <a:cubicBezTo>
+                  <a:pt x="1267503" y="9376"/>
+                  <a:pt x="1485778" y="-20470"/>
+                  <a:pt x="1774589" y="0"/>
+                </a:cubicBezTo>
+                <a:cubicBezTo>
+                  <a:pt x="2063400" y="20470"/>
+                  <a:pt x="2090152" y="-14502"/>
+                  <a:pt x="2351641" y="0"/>
+                </a:cubicBezTo>
+                <a:cubicBezTo>
+                  <a:pt x="2613130" y="14502"/>
+                  <a:pt x="2802864" y="19125"/>
+                  <a:pt x="2928693" y="0"/>
+                </a:cubicBezTo>
+                <a:cubicBezTo>
+                  <a:pt x="3054522" y="-19125"/>
+                  <a:pt x="3482611" y="-2038"/>
+                  <a:pt x="3636046" y="0"/>
+                </a:cubicBezTo>
+                <a:cubicBezTo>
+                  <a:pt x="3789481" y="2038"/>
+                  <a:pt x="4012363" y="973"/>
+                  <a:pt x="4343400" y="0"/>
+                </a:cubicBezTo>
+                <a:cubicBezTo>
+                  <a:pt x="4342514" y="5429"/>
+                  <a:pt x="4344221" y="14046"/>
+                  <a:pt x="4343400" y="18288"/>
+                </a:cubicBezTo>
+                <a:cubicBezTo>
+                  <a:pt x="4078870" y="-6138"/>
+                  <a:pt x="4015967" y="29658"/>
+                  <a:pt x="3809782" y="18288"/>
+                </a:cubicBezTo>
+                <a:cubicBezTo>
+                  <a:pt x="3603597" y="6918"/>
+                  <a:pt x="3495552" y="24439"/>
+                  <a:pt x="3189297" y="18288"/>
+                </a:cubicBezTo>
+                <a:cubicBezTo>
+                  <a:pt x="2883042" y="12137"/>
+                  <a:pt x="2850610" y="32583"/>
+                  <a:pt x="2568811" y="18288"/>
+                </a:cubicBezTo>
+                <a:cubicBezTo>
+                  <a:pt x="2287012" y="3993"/>
+                  <a:pt x="2279820" y="23580"/>
+                  <a:pt x="1991759" y="18288"/>
+                </a:cubicBezTo>
+                <a:cubicBezTo>
+                  <a:pt x="1703698" y="12996"/>
+                  <a:pt x="1616455" y="23157"/>
+                  <a:pt x="1284405" y="18288"/>
+                </a:cubicBezTo>
+                <a:cubicBezTo>
+                  <a:pt x="952355" y="13419"/>
+                  <a:pt x="783530" y="16053"/>
+                  <a:pt x="577052" y="18288"/>
+                </a:cubicBezTo>
+                <a:cubicBezTo>
+                  <a:pt x="370574" y="20523"/>
+                  <a:pt x="173929" y="5195"/>
+                  <a:pt x="0" y="18288"/>
+                </a:cubicBezTo>
+                <a:cubicBezTo>
+                  <a:pt x="668" y="13665"/>
+                  <a:pt x="578" y="5675"/>
+                  <a:pt x="0" y="0"/>
+                </a:cubicBezTo>
+                <a:close/>
+              </a:path>
+            </a:pathLst>
+          </a:custGeom>
+          <a:solidFill>
+            <a:schemeClr val="accent2"/>
+          </a:solidFill>
+          <a:ln w="41275" cap="rnd">
+            <a:solidFill>
+              <a:schemeClr val="accent2"/>
+            </a:solidFill>
+            <a:round/>
+            <a:extLst>
+              <a:ext uri="{C807C97D-BFC1-408E-A445-0C87EB9F89A2}">
+                <ask:lineSketchStyleProps xmlns:ask="http://schemas.microsoft.com/office/drawing/2018/sketchyshapes" sd="1219033472">
+                  <a:prstGeom prst="rect">
+                    <a:avLst/>
+                  </a:prstGeom>
+                  <ask:type>
+                    <ask:lineSketchFreehand/>
+                  </ask:type>
+                </ask:lineSketchStyleProps>
+              </a:ext>
+            </a:extLst>
+          </a:ln>
+        </p:spPr>
+        <p:style>
+          <a:lnRef idx="2">
+            <a:schemeClr val="accent1">
+              <a:shade val="50000"/>
+            </a:schemeClr>
+          </a:lnRef>
+          <a:fillRef idx="1">
+            <a:schemeClr val="accent1"/>
+          </a:fillRef>
+          <a:effectRef idx="0">
+            <a:schemeClr val="accent1"/>
+          </a:effectRef>
+          <a:fontRef idx="minor">
+            <a:schemeClr val="lt1"/>
+          </a:fontRef>
+        </p:style>
+        <p:txBody>
+          <a:bodyPr rtlCol="0" anchor="ctr"/>
+          <a:lstStyle/>
+          <a:p>
+            <a:pPr algn="ctr"/>
+            <a:endParaRPr lang="en-US"/>
+          </a:p>
+        </p:txBody>
+      </p:sp>
+      <p:sp>
+        <p:nvSpPr>
+          <p:cNvPr id="3" name="Segnaposto contenuto 2">
+            <a:extLst>
+              <a:ext uri="{FF2B5EF4-FFF2-40B4-BE49-F238E27FC236}">
+                <a16:creationId xmlns:a16="http://schemas.microsoft.com/office/drawing/2014/main" id="{D3871264-FF9D-42E5-B46D-E2B7D6B273E2}"/>
+              </a:ext>
+            </a:extLst>
+          </p:cNvPr>
+          <p:cNvSpPr>
+            <a:spLocks noGrp="1"/>
+          </p:cNvSpPr>
+          <p:nvPr>
+            <p:ph idx="1"/>
+          </p:nvPr>
+        </p:nvSpPr>
+        <p:spPr>
+          <a:xfrm>
+            <a:off x="612648" y="2504819"/>
+            <a:ext cx="7205986" cy="3672144"/>
+          </a:xfrm>
+        </p:spPr>
+        <p:txBody>
+          <a:bodyPr>
+            <a:normAutofit/>
+          </a:bodyPr>
+          <a:lstStyle/>
+          <a:p>
+            <a:r>
+              <a:rPr lang="it-IT" sz="1600" dirty="0">
+                <a:solidFill>
+                  <a:schemeClr val="bg1"/>
+                </a:solidFill>
+              </a:rPr>
+              <a:t>The </a:t>
+            </a:r>
+            <a:r>
+              <a:rPr lang="it-IT" sz="1600" dirty="0" err="1">
+                <a:solidFill>
+                  <a:schemeClr val="bg1"/>
+                </a:solidFill>
+              </a:rPr>
+              <a:t>app</a:t>
+            </a:r>
+            <a:r>
+              <a:rPr lang="it-IT" sz="1600" dirty="0">
+                <a:solidFill>
+                  <a:schemeClr val="bg1"/>
+                </a:solidFill>
+              </a:rPr>
+              <a:t> </a:t>
+            </a:r>
+            <a:r>
+              <a:rPr lang="it-IT" sz="1600" dirty="0" err="1">
+                <a:solidFill>
+                  <a:schemeClr val="bg1"/>
+                </a:solidFill>
+              </a:rPr>
+              <a:t>will</a:t>
+            </a:r>
+            <a:r>
+              <a:rPr lang="it-IT" sz="1600" dirty="0">
+                <a:solidFill>
+                  <a:schemeClr val="bg1"/>
+                </a:solidFill>
+              </a:rPr>
+              <a:t> </a:t>
+            </a:r>
+            <a:r>
+              <a:rPr lang="it-IT" sz="1600" dirty="0" err="1">
+                <a:solidFill>
+                  <a:schemeClr val="bg1"/>
+                </a:solidFill>
+              </a:rPr>
+              <a:t>try</a:t>
+            </a:r>
+            <a:r>
+              <a:rPr lang="it-IT" sz="1600" dirty="0">
+                <a:solidFill>
+                  <a:schemeClr val="bg1"/>
+                </a:solidFill>
+              </a:rPr>
+              <a:t> to motivate </a:t>
+            </a:r>
+            <a:r>
+              <a:rPr lang="it-IT" sz="1600" dirty="0" err="1">
+                <a:solidFill>
+                  <a:schemeClr val="bg1"/>
+                </a:solidFill>
+              </a:rPr>
+              <a:t>even</a:t>
+            </a:r>
+            <a:r>
+              <a:rPr lang="it-IT" sz="1600" dirty="0">
+                <a:solidFill>
+                  <a:schemeClr val="bg1"/>
+                </a:solidFill>
+              </a:rPr>
+              <a:t> the </a:t>
+            </a:r>
+            <a:r>
+              <a:rPr lang="it-IT" sz="1600" dirty="0" err="1">
+                <a:solidFill>
+                  <a:schemeClr val="bg1"/>
+                </a:solidFill>
+              </a:rPr>
+              <a:t>laziest</a:t>
+            </a:r>
+            <a:r>
+              <a:rPr lang="it-IT" sz="1600" dirty="0">
+                <a:solidFill>
+                  <a:schemeClr val="bg1"/>
+                </a:solidFill>
+              </a:rPr>
+              <a:t> </a:t>
+            </a:r>
+            <a:r>
+              <a:rPr lang="it-IT" sz="1600" dirty="0" err="1">
+                <a:solidFill>
+                  <a:schemeClr val="bg1"/>
+                </a:solidFill>
+              </a:rPr>
+              <a:t>users</a:t>
+            </a:r>
+            <a:r>
+              <a:rPr lang="it-IT" sz="1600" dirty="0">
+                <a:solidFill>
+                  <a:schemeClr val="bg1"/>
+                </a:solidFill>
+              </a:rPr>
+              <a:t> </a:t>
+            </a:r>
+            <a:r>
+              <a:rPr lang="it-IT" sz="1600" dirty="0" err="1">
+                <a:solidFill>
+                  <a:schemeClr val="bg1"/>
+                </a:solidFill>
+              </a:rPr>
+              <a:t>sending</a:t>
+            </a:r>
+            <a:r>
+              <a:rPr lang="it-IT" sz="1600" dirty="0">
+                <a:solidFill>
+                  <a:schemeClr val="bg1"/>
+                </a:solidFill>
+              </a:rPr>
+              <a:t> </a:t>
+            </a:r>
+            <a:r>
+              <a:rPr lang="it-IT" sz="1600" dirty="0" err="1">
+                <a:solidFill>
+                  <a:schemeClr val="bg1"/>
+                </a:solidFill>
+              </a:rPr>
+              <a:t>regularly</a:t>
+            </a:r>
+            <a:r>
+              <a:rPr lang="it-IT" sz="1600" dirty="0">
+                <a:solidFill>
+                  <a:schemeClr val="bg1"/>
+                </a:solidFill>
+              </a:rPr>
+              <a:t> </a:t>
+            </a:r>
+            <a:r>
+              <a:rPr lang="it-IT" sz="1600" dirty="0" err="1">
+                <a:solidFill>
+                  <a:schemeClr val="bg1"/>
+                </a:solidFill>
+              </a:rPr>
+              <a:t>notifications</a:t>
+            </a:r>
+            <a:r>
+              <a:rPr lang="it-IT" sz="1600" dirty="0">
+                <a:solidFill>
+                  <a:schemeClr val="bg1"/>
+                </a:solidFill>
+              </a:rPr>
+              <a:t>.</a:t>
+            </a:r>
+          </a:p>
+          <a:p>
+            <a:r>
+              <a:rPr lang="it-IT" sz="1600" dirty="0" err="1">
+                <a:solidFill>
+                  <a:schemeClr val="bg1"/>
+                </a:solidFill>
+              </a:rPr>
+              <a:t>It</a:t>
+            </a:r>
+            <a:r>
+              <a:rPr lang="it-IT" sz="1600" dirty="0">
+                <a:solidFill>
+                  <a:schemeClr val="bg1"/>
+                </a:solidFill>
+              </a:rPr>
+              <a:t> </a:t>
+            </a:r>
+            <a:r>
+              <a:rPr lang="it-IT" sz="1600" dirty="0" err="1">
+                <a:solidFill>
+                  <a:schemeClr val="bg1"/>
+                </a:solidFill>
+              </a:rPr>
+              <a:t>is</a:t>
+            </a:r>
+            <a:r>
+              <a:rPr lang="it-IT" sz="1600" dirty="0">
+                <a:solidFill>
+                  <a:schemeClr val="bg1"/>
+                </a:solidFill>
+              </a:rPr>
+              <a:t> </a:t>
+            </a:r>
+            <a:r>
+              <a:rPr lang="it-IT" sz="1600" dirty="0" err="1">
+                <a:solidFill>
+                  <a:schemeClr val="bg1"/>
+                </a:solidFill>
+              </a:rPr>
               <a:t>going</a:t>
             </a:r>
             <a:r>
-              <a:rPr lang="it-IT" dirty="0"/>
+              <a:rPr lang="it-IT" sz="1600" dirty="0">
+                <a:solidFill>
+                  <a:schemeClr val="bg1"/>
+                </a:solidFill>
+              </a:rPr>
               <a:t> to be </a:t>
             </a:r>
             <a:r>
-              <a:rPr lang="it-IT" dirty="0" err="1"/>
+              <a:rPr lang="it-IT" sz="1600" dirty="0" err="1">
+                <a:solidFill>
+                  <a:schemeClr val="bg1"/>
+                </a:solidFill>
+              </a:rPr>
               <a:t>implemented</a:t>
             </a:r>
             <a:r>
-              <a:rPr lang="it-IT" dirty="0"/>
+              <a:rPr lang="it-IT" sz="1600" dirty="0">
+                <a:solidFill>
+                  <a:schemeClr val="bg1"/>
+                </a:solidFill>
+              </a:rPr>
               <a:t> </a:t>
             </a:r>
             <a:r>
-              <a:rPr lang="it-IT" dirty="0" err="1"/>
+              <a:rPr lang="it-IT" sz="1600" dirty="0" err="1">
+                <a:solidFill>
+                  <a:schemeClr val="bg1"/>
+                </a:solidFill>
+              </a:rPr>
               <a:t>based</a:t>
             </a:r>
             <a:r>
-              <a:rPr lang="it-IT" dirty="0"/>
-              <a:t> of the step</a:t>
-            </a:r>
-            <a:r>
-              <a:rPr lang="en-US" dirty="0"/>
-              <a:t>-app used in the course tutorials, including </a:t>
-            </a:r>
-            <a:r>
-              <a:rPr lang="it-IT" dirty="0" err="1"/>
-              <a:t>Navigation</a:t>
-            </a:r>
-            <a:r>
-              <a:rPr lang="it-IT" dirty="0"/>
-              <a:t> </a:t>
-            </a:r>
-            <a:r>
-              <a:rPr lang="it-IT" dirty="0" err="1"/>
-              <a:t>Drawer</a:t>
-            </a:r>
-            <a:r>
-              <a:rPr lang="it-IT" dirty="0"/>
-              <a:t>, </a:t>
-            </a:r>
-            <a:r>
-              <a:rPr lang="it-IT" dirty="0" err="1"/>
-              <a:t>intents</a:t>
-            </a:r>
-            <a:r>
-              <a:rPr lang="it-IT" dirty="0"/>
-              <a:t> and </a:t>
-            </a:r>
-            <a:r>
-              <a:rPr lang="it-IT" dirty="0" err="1"/>
-              <a:t>notifications</a:t>
-            </a:r>
-            <a:r>
-              <a:rPr lang="en-US" dirty="0"/>
+              <a:rPr lang="it-IT" sz="1600" dirty="0">
+                <a:solidFill>
+                  <a:schemeClr val="bg1"/>
+                </a:solidFill>
+              </a:rPr>
+              <a:t> of the </a:t>
+            </a:r>
+            <a:r>
+              <a:rPr lang="it-IT" sz="1600" dirty="0" err="1">
+                <a:solidFill>
+                  <a:schemeClr val="bg1"/>
+                </a:solidFill>
+              </a:rPr>
+              <a:t>step</a:t>
+            </a:r>
+            <a:r>
+              <a:rPr lang="en-US" sz="1600" dirty="0">
+                <a:solidFill>
+                  <a:schemeClr val="bg1"/>
+                </a:solidFill>
+              </a:rPr>
+              <a:t>-app used in the course tutorials.</a:t>
+            </a:r>
+          </a:p>
+          <a:p>
+            <a:r>
+              <a:rPr lang="en-US" sz="1600" dirty="0">
+                <a:solidFill>
+                  <a:schemeClr val="bg1"/>
+                </a:solidFill>
+              </a:rPr>
+              <a:t>Recipes and ingredients will have their own external databases, so the app requires an internet access to fully work.</a:t>
+            </a:r>
+          </a:p>
+          <a:p>
+            <a:r>
+              <a:rPr lang="en-US" sz="1600" dirty="0">
+                <a:solidFill>
+                  <a:schemeClr val="bg1"/>
+                </a:solidFill>
+              </a:rPr>
+              <a:t>The steps done will be held in local memory, and then converted in calories using also weight and height </a:t>
+            </a:r>
+            <a:r>
+              <a:rPr lang="en-US" sz="1600" dirty="0" err="1">
+                <a:solidFill>
+                  <a:schemeClr val="bg1"/>
+                </a:solidFill>
+              </a:rPr>
+              <a:t>informations</a:t>
+            </a:r>
+            <a:r>
+              <a:rPr lang="en-US" sz="1600" dirty="0">
+                <a:solidFill>
+                  <a:schemeClr val="bg1"/>
+                </a:solidFill>
+              </a:rPr>
               <a:t>.</a:t>
             </a:r>
           </a:p>
           <a:p>
             <a:r>
-              <a:rPr lang="en-US" dirty="0"/>
-              <a:t>Recipes and ingredients will have their own databases, to implement (possibly?) externally, in that case the app require an internet access to work.</a:t>
-            </a:r>
-          </a:p>
-          <a:p>
-            <a:r>
-              <a:rPr lang="en-US" dirty="0"/>
-              <a:t>The steps done will be held in local memory and converted in calories when requested using a specific formula.</a:t>
-            </a:r>
-          </a:p>
-          <a:p>
-            <a:r>
-              <a:rPr lang="en-US" dirty="0"/>
+              <a:rPr lang="en-US" sz="1600" dirty="0">
+                <a:solidFill>
+                  <a:schemeClr val="bg1"/>
+                </a:solidFill>
+              </a:rPr>
               <a:t>The main algorithm will access databases and calories got from the last meal and search the possible recipe based on that and the available ingredients.</a:t>
             </a:r>
           </a:p>
           <a:p>
             <a:r>
-              <a:rPr lang="en-US" dirty="0"/>
-              <a:t>Notifications and data visualization (along with user’s </a:t>
-            </a:r>
-            <a:r>
-              <a:rPr lang="en-US" dirty="0" err="1"/>
+              <a:rPr lang="en-US" sz="1600" dirty="0">
+                <a:solidFill>
+                  <a:schemeClr val="bg1"/>
+                </a:solidFill>
+              </a:rPr>
+              <a:t>Notifications and data visualization – along with user’s </a:t>
+            </a:r>
+            <a:r>
+              <a:rPr lang="en-US" sz="1600" dirty="0" err="1">
+                <a:solidFill>
+                  <a:schemeClr val="bg1"/>
+                </a:solidFill>
+              </a:rPr>
               <a:t>informations</a:t>
             </a:r>
             <a:r>
-              <a:rPr lang="en-US" dirty="0"/>
-              <a:t>) will be customizable in the dedicated setting page.</a:t>
-            </a:r>
-          </a:p>
-        </p:txBody>
-      </p:sp>
+              <a:rPr lang="en-US" sz="1600" dirty="0">
+                <a:solidFill>
+                  <a:schemeClr val="bg1"/>
+                </a:solidFill>
+              </a:rPr>
+              <a:t> – will be customizable in the dedicated setting page.</a:t>
+            </a:r>
+          </a:p>
+        </p:txBody>
+      </p:sp>
+      <p:pic>
+        <p:nvPicPr>
+          <p:cNvPr id="4098" name="Picture 2">
+            <a:extLst>
+              <a:ext uri="{FF2B5EF4-FFF2-40B4-BE49-F238E27FC236}">
+                <a16:creationId xmlns:a16="http://schemas.microsoft.com/office/drawing/2014/main" id="{AEA89E07-2E96-4344-BC3F-B4AEEF7C5A6A}"/>
+              </a:ext>
+            </a:extLst>
+          </p:cNvPr>
+          <p:cNvPicPr>
+            <a:picLocks noChangeAspect="1" noChangeArrowheads="1"/>
+          </p:cNvPicPr>
+          <p:nvPr/>
+        </p:nvPicPr>
+        <p:blipFill rotWithShape="1">
+          <a:blip r:embed="rId3">
+            <a:extLst>
+              <a:ext uri="{28A0092B-C50C-407E-A947-70E740481C1C}">
+                <a14:useLocalDpi xmlns:a14="http://schemas.microsoft.com/office/drawing/2010/main" val="0"/>
+              </a:ext>
+            </a:extLst>
+          </a:blip>
+          <a:srcRect b="8017"/>
+          <a:stretch/>
+        </p:blipFill>
+        <p:spPr bwMode="auto">
+          <a:xfrm>
+            <a:off x="8724167" y="204631"/>
+            <a:ext cx="2844246" cy="1890220"/>
+          </a:xfrm>
+          <a:prstGeom prst="rect">
+            <a:avLst/>
+          </a:prstGeom>
+          <a:noFill/>
+          <a:extLst>
+            <a:ext uri="{909E8E84-426E-40DD-AFC4-6F175D3DCCD1}">
+              <a14:hiddenFill xmlns:a14="http://schemas.microsoft.com/office/drawing/2010/main">
+                <a:solidFill>
+                  <a:srgbClr val="FFFFFF"/>
+                </a:solidFill>
+              </a14:hiddenFill>
+            </a:ext>
+          </a:extLst>
+        </p:spPr>
+      </p:pic>
+      <p:pic>
+        <p:nvPicPr>
+          <p:cNvPr id="16" name="Picture 4" descr="A person sitting on a couch using a cell phone&#10;&#10;Description automatically generated">
+            <a:extLst>
+              <a:ext uri="{FF2B5EF4-FFF2-40B4-BE49-F238E27FC236}">
+                <a16:creationId xmlns:a16="http://schemas.microsoft.com/office/drawing/2014/main" id="{07082794-23CF-284A-A279-317BF1FAA6BB}"/>
+              </a:ext>
+            </a:extLst>
+          </p:cNvPr>
+          <p:cNvPicPr>
+            <a:picLocks noChangeAspect="1" noChangeArrowheads="1"/>
+          </p:cNvPicPr>
+          <p:nvPr/>
+        </p:nvPicPr>
+        <p:blipFill rotWithShape="1">
+          <a:blip r:embed="rId4">
+            <a:extLst>
+              <a:ext uri="{28A0092B-C50C-407E-A947-70E740481C1C}">
+                <a14:useLocalDpi xmlns:a14="http://schemas.microsoft.com/office/drawing/2010/main" val="0"/>
+              </a:ext>
+            </a:extLst>
+          </a:blip>
+          <a:srcRect b="8075"/>
+          <a:stretch/>
+        </p:blipFill>
+        <p:spPr bwMode="auto">
+          <a:xfrm>
+            <a:off x="8722372" y="2281406"/>
+            <a:ext cx="2846041" cy="1890220"/>
+          </a:xfrm>
+          <a:prstGeom prst="rect">
+            <a:avLst/>
+          </a:prstGeom>
+          <a:noFill/>
+          <a:extLst>
+            <a:ext uri="{909E8E84-426E-40DD-AFC4-6F175D3DCCD1}">
+              <a14:hiddenFill xmlns:a14="http://schemas.microsoft.com/office/drawing/2010/main">
+                <a:solidFill>
+                  <a:srgbClr val="FFFFFF"/>
+                </a:solidFill>
+              </a14:hiddenFill>
+            </a:ext>
+          </a:extLst>
+        </p:spPr>
+      </p:pic>
     </p:spTree>
     <p:extLst>
       <p:ext uri="{BB962C8B-B14F-4D97-AF65-F5344CB8AC3E}">
@@ -3795,6 +5454,14 @@
 <file path=ppt/slides/slide4.xml><?xml version="1.0" encoding="utf-8"?>
 <p:sld xmlns:a="http://schemas.openxmlformats.org/drawingml/2006/main" xmlns:r="http://schemas.openxmlformats.org/officeDocument/2006/relationships" xmlns:p="http://schemas.openxmlformats.org/presentationml/2006/main">
   <p:cSld>
+    <p:bg>
+      <p:bgPr>
+        <a:solidFill>
+          <a:srgbClr val="3F3F3F"/>
+        </a:solidFill>
+        <a:effectLst/>
+      </p:bgPr>
+    </p:bg>
     <p:spTree>
       <p:nvGrpSpPr>
         <p:cNvPr id="1" name=""/>
@@ -3811,10 +5478,10 @@
       </p:grpSpPr>
       <p:sp>
         <p:nvSpPr>
-          <p:cNvPr id="2" name="Titolo 1">
-            <a:extLst>
-              <a:ext uri="{FF2B5EF4-FFF2-40B4-BE49-F238E27FC236}">
-                <a16:creationId xmlns:a16="http://schemas.microsoft.com/office/drawing/2014/main" id="{1D0E62C6-B4C0-4D7D-80E8-B25A048E82BC}"/>
+          <p:cNvPr id="6" name="Title 5">
+            <a:extLst>
+              <a:ext uri="{FF2B5EF4-FFF2-40B4-BE49-F238E27FC236}">
+                <a16:creationId xmlns:a16="http://schemas.microsoft.com/office/drawing/2014/main" id="{862CC880-1DBE-6644-933A-4EE9DECF1EAA}"/>
               </a:ext>
             </a:extLst>
           </p:cNvPr>
@@ -3831,29 +5498,31 @@
           <a:lstStyle/>
           <a:p>
             <a:r>
-              <a:rPr lang="it-IT" dirty="0"/>
-              <a:t>Storyboard </a:t>
+              <a:rPr lang="en-CH" dirty="0">
+                <a:solidFill>
+                  <a:schemeClr val="bg1"/>
+                </a:solidFill>
+              </a:rPr>
+              <a:t>STORYBOARD</a:t>
             </a:r>
           </a:p>
         </p:txBody>
       </p:sp>
       <p:pic>
         <p:nvPicPr>
-          <p:cNvPr id="5" name="Segnaposto contenuto 4">
-            <a:extLst>
-              <a:ext uri="{FF2B5EF4-FFF2-40B4-BE49-F238E27FC236}">
-                <a16:creationId xmlns:a16="http://schemas.microsoft.com/office/drawing/2014/main" id="{399BC0C8-2F9F-47CE-8325-0091D9085FF0}"/>
+          <p:cNvPr id="12" name="Picture 11" descr="Graphical user interface, application, Teams&#10;&#10;Description automatically generated">
+            <a:extLst>
+              <a:ext uri="{FF2B5EF4-FFF2-40B4-BE49-F238E27FC236}">
+                <a16:creationId xmlns:a16="http://schemas.microsoft.com/office/drawing/2014/main" id="{4130698D-6840-C846-A8E6-E3D57E070CCC}"/>
               </a:ext>
             </a:extLst>
           </p:cNvPr>
           <p:cNvPicPr>
-            <a:picLocks noGrp="1" noChangeAspect="1"/>
+            <a:picLocks noChangeAspect="1"/>
           </p:cNvPicPr>
-          <p:nvPr>
-            <p:ph idx="1"/>
-          </p:nvPr>
+          <p:nvPr/>
         </p:nvPicPr>
-        <p:blipFill>
+        <p:blipFill rotWithShape="1">
           <a:blip r:embed="rId2">
             <a:extLst>
               <a:ext uri="{28A0092B-C50C-407E-A947-70E740481C1C}">
@@ -3861,15 +5530,17 @@
               </a:ext>
             </a:extLst>
           </a:blip>
-          <a:stretch>
-            <a:fillRect/>
-          </a:stretch>
+          <a:srcRect l="18106" t="14113" r="27121" b="18886"/>
+          <a:stretch/>
         </p:blipFill>
         <p:spPr>
           <a:xfrm>
-            <a:off x="620896" y="1406525"/>
-            <a:ext cx="4894079" cy="5039760"/>
+            <a:off x="1756022" y="1690688"/>
+            <a:ext cx="8679955" cy="4802187"/>
           </a:xfrm>
+          <a:prstGeom prst="rect">
+            <a:avLst/>
+          </a:prstGeom>
         </p:spPr>
       </p:pic>
     </p:spTree>
@@ -3888,6 +5559,14 @@
 <file path=ppt/slides/slide5.xml><?xml version="1.0" encoding="utf-8"?>
 <p:sld xmlns:a="http://schemas.openxmlformats.org/drawingml/2006/main" xmlns:r="http://schemas.openxmlformats.org/officeDocument/2006/relationships" xmlns:p="http://schemas.openxmlformats.org/presentationml/2006/main">
   <p:cSld>
+    <p:bg>
+      <p:bgPr>
+        <a:solidFill>
+          <a:srgbClr val="3F3F3F"/>
+        </a:solidFill>
+        <a:effectLst/>
+      </p:bgPr>
+    </p:bg>
     <p:spTree>
       <p:nvGrpSpPr>
         <p:cNvPr id="1" name=""/>
@@ -3924,42 +5603,99 @@
           <a:lstStyle/>
           <a:p>
             <a:r>
-              <a:rPr lang="it-IT" dirty="0"/>
-              <a:t>Thank </a:t>
-            </a:r>
-            <a:r>
-              <a:rPr lang="it-IT" dirty="0" err="1"/>
-              <a:t>you</a:t>
-            </a:r>
-            <a:r>
-              <a:rPr lang="it-IT" dirty="0"/>
-              <a:t> slide</a:t>
-            </a:r>
-          </a:p>
-        </p:txBody>
-      </p:sp>
-      <p:sp>
-        <p:nvSpPr>
-          <p:cNvPr id="3" name="Segnaposto testo 2">
-            <a:extLst>
-              <a:ext uri="{FF2B5EF4-FFF2-40B4-BE49-F238E27FC236}">
-                <a16:creationId xmlns:a16="http://schemas.microsoft.com/office/drawing/2014/main" id="{C6DEA34C-B3B9-422A-B928-435F9117DF4A}"/>
-              </a:ext>
-            </a:extLst>
-          </p:cNvPr>
-          <p:cNvSpPr>
-            <a:spLocks noGrp="1"/>
-          </p:cNvSpPr>
-          <p:nvPr>
-            <p:ph type="body" idx="1"/>
-          </p:nvPr>
-        </p:nvSpPr>
-        <p:spPr/>
-        <p:txBody>
-          <a:bodyPr/>
-          <a:lstStyle/>
-          <a:p>
-            <a:endParaRPr lang="it-IT"/>
+              <a:rPr lang="it-IT" dirty="0" err="1">
+                <a:solidFill>
+                  <a:schemeClr val="bg1"/>
+                </a:solidFill>
+              </a:rPr>
+              <a:t>Thanks</a:t>
+            </a:r>
+            <a:r>
+              <a:rPr lang="it-IT" dirty="0">
+                <a:solidFill>
+                  <a:schemeClr val="bg1"/>
+                </a:solidFill>
+              </a:rPr>
+              <a:t> for </a:t>
+            </a:r>
+            <a:r>
+              <a:rPr lang="it-IT" dirty="0" err="1">
+                <a:solidFill>
+                  <a:schemeClr val="bg1"/>
+                </a:solidFill>
+              </a:rPr>
+              <a:t>your</a:t>
+            </a:r>
+            <a:r>
+              <a:rPr lang="it-IT" dirty="0">
+                <a:solidFill>
+                  <a:schemeClr val="bg1"/>
+                </a:solidFill>
+              </a:rPr>
+              <a:t> </a:t>
+            </a:r>
+            <a:r>
+              <a:rPr lang="it-IT" dirty="0" err="1">
+                <a:solidFill>
+                  <a:schemeClr val="bg1"/>
+                </a:solidFill>
+              </a:rPr>
+              <a:t>attention</a:t>
+            </a:r>
+            <a:r>
+              <a:rPr lang="it-IT" dirty="0">
+                <a:solidFill>
+                  <a:schemeClr val="bg1"/>
+                </a:solidFill>
+              </a:rPr>
+              <a:t>!</a:t>
+            </a:r>
+            <a:br>
+              <a:rPr lang="it-IT" dirty="0">
+                <a:solidFill>
+                  <a:schemeClr val="bg1"/>
+                </a:solidFill>
+              </a:rPr>
+            </a:br>
+            <a:br>
+              <a:rPr lang="it-IT" dirty="0">
+                <a:solidFill>
+                  <a:schemeClr val="bg1"/>
+                </a:solidFill>
+              </a:rPr>
+            </a:br>
+            <a:r>
+              <a:rPr lang="it-IT" dirty="0" err="1">
+                <a:solidFill>
+                  <a:schemeClr val="bg1"/>
+                </a:solidFill>
+              </a:rPr>
+              <a:t>Any</a:t>
+            </a:r>
+            <a:r>
+              <a:rPr lang="it-IT" dirty="0">
+                <a:solidFill>
+                  <a:schemeClr val="bg1"/>
+                </a:solidFill>
+              </a:rPr>
+              <a:t> </a:t>
+            </a:r>
+            <a:r>
+              <a:rPr lang="it-IT" dirty="0" err="1">
+                <a:solidFill>
+                  <a:schemeClr val="bg1"/>
+                </a:solidFill>
+              </a:rPr>
+              <a:t>questions</a:t>
+            </a:r>
+            <a:r>
+              <a:rPr lang="it-IT" dirty="0">
+                <a:solidFill>
+                  <a:schemeClr val="bg1"/>
+                </a:solidFill>
+              </a:rPr>
+              <a:t>?</a:t>
+            </a:r>
           </a:p>
         </p:txBody>
       </p:sp>

</xml_diff>

<commit_message>
First layout of the app
</commit_message>
<xml_diff>
--- a/presentation/presentazione FAO.pptx
+++ b/presentation/presentazione FAO.pptx
@@ -287,7 +287,7 @@
           <a:p>
             <a:fld id="{C513A26C-1484-4743-BBFB-ED973AB48944}" type="datetimeFigureOut">
               <a:rPr lang="it-IT" smtClean="0"/>
-              <a:t>05/11/20</a:t>
+              <a:t>06/11/20</a:t>
             </a:fld>
             <a:endParaRPr lang="it-IT"/>
           </a:p>
@@ -485,7 +485,7 @@
           <a:p>
             <a:fld id="{C513A26C-1484-4743-BBFB-ED973AB48944}" type="datetimeFigureOut">
               <a:rPr lang="it-IT" smtClean="0"/>
-              <a:t>05/11/20</a:t>
+              <a:t>06/11/20</a:t>
             </a:fld>
             <a:endParaRPr lang="it-IT"/>
           </a:p>
@@ -693,7 +693,7 @@
           <a:p>
             <a:fld id="{C513A26C-1484-4743-BBFB-ED973AB48944}" type="datetimeFigureOut">
               <a:rPr lang="it-IT" smtClean="0"/>
-              <a:t>05/11/20</a:t>
+              <a:t>06/11/20</a:t>
             </a:fld>
             <a:endParaRPr lang="it-IT"/>
           </a:p>
@@ -891,7 +891,7 @@
           <a:p>
             <a:fld id="{C513A26C-1484-4743-BBFB-ED973AB48944}" type="datetimeFigureOut">
               <a:rPr lang="it-IT" smtClean="0"/>
-              <a:t>05/11/20</a:t>
+              <a:t>06/11/20</a:t>
             </a:fld>
             <a:endParaRPr lang="it-IT"/>
           </a:p>
@@ -1166,7 +1166,7 @@
           <a:p>
             <a:fld id="{C513A26C-1484-4743-BBFB-ED973AB48944}" type="datetimeFigureOut">
               <a:rPr lang="it-IT" smtClean="0"/>
-              <a:t>05/11/20</a:t>
+              <a:t>06/11/20</a:t>
             </a:fld>
             <a:endParaRPr lang="it-IT"/>
           </a:p>
@@ -1431,7 +1431,7 @@
           <a:p>
             <a:fld id="{C513A26C-1484-4743-BBFB-ED973AB48944}" type="datetimeFigureOut">
               <a:rPr lang="it-IT" smtClean="0"/>
-              <a:t>05/11/20</a:t>
+              <a:t>06/11/20</a:t>
             </a:fld>
             <a:endParaRPr lang="it-IT"/>
           </a:p>
@@ -1843,7 +1843,7 @@
           <a:p>
             <a:fld id="{C513A26C-1484-4743-BBFB-ED973AB48944}" type="datetimeFigureOut">
               <a:rPr lang="it-IT" smtClean="0"/>
-              <a:t>05/11/20</a:t>
+              <a:t>06/11/20</a:t>
             </a:fld>
             <a:endParaRPr lang="it-IT"/>
           </a:p>
@@ -1984,7 +1984,7 @@
           <a:p>
             <a:fld id="{C513A26C-1484-4743-BBFB-ED973AB48944}" type="datetimeFigureOut">
               <a:rPr lang="it-IT" smtClean="0"/>
-              <a:t>05/11/20</a:t>
+              <a:t>06/11/20</a:t>
             </a:fld>
             <a:endParaRPr lang="it-IT"/>
           </a:p>
@@ -2097,7 +2097,7 @@
           <a:p>
             <a:fld id="{C513A26C-1484-4743-BBFB-ED973AB48944}" type="datetimeFigureOut">
               <a:rPr lang="it-IT" smtClean="0"/>
-              <a:t>05/11/20</a:t>
+              <a:t>06/11/20</a:t>
             </a:fld>
             <a:endParaRPr lang="it-IT"/>
           </a:p>
@@ -2408,7 +2408,7 @@
           <a:p>
             <a:fld id="{C513A26C-1484-4743-BBFB-ED973AB48944}" type="datetimeFigureOut">
               <a:rPr lang="it-IT" smtClean="0"/>
-              <a:t>05/11/20</a:t>
+              <a:t>06/11/20</a:t>
             </a:fld>
             <a:endParaRPr lang="it-IT"/>
           </a:p>
@@ -2696,7 +2696,7 @@
           <a:p>
             <a:fld id="{C513A26C-1484-4743-BBFB-ED973AB48944}" type="datetimeFigureOut">
               <a:rPr lang="it-IT" smtClean="0"/>
-              <a:t>05/11/20</a:t>
+              <a:t>06/11/20</a:t>
             </a:fld>
             <a:endParaRPr lang="it-IT"/>
           </a:p>
@@ -2937,7 +2937,7 @@
           <a:p>
             <a:fld id="{C513A26C-1484-4743-BBFB-ED973AB48944}" type="datetimeFigureOut">
               <a:rPr lang="it-IT" smtClean="0"/>
-              <a:t>05/11/20</a:t>
+              <a:t>06/11/20</a:t>
             </a:fld>
             <a:endParaRPr lang="it-IT"/>
           </a:p>
@@ -5494,11 +5494,13 @@
         </p:nvSpPr>
         <p:spPr/>
         <p:txBody>
-          <a:bodyPr/>
+          <a:bodyPr>
+            <a:normAutofit/>
+          </a:bodyPr>
           <a:lstStyle/>
           <a:p>
             <a:r>
-              <a:rPr lang="en-CH" dirty="0">
+              <a:rPr lang="en-CH" sz="5400" dirty="0">
                 <a:solidFill>
                   <a:schemeClr val="bg1"/>
                 </a:solidFill>
@@ -5535,8 +5537,8 @@
         </p:blipFill>
         <p:spPr>
           <a:xfrm>
-            <a:off x="1756022" y="1690688"/>
-            <a:ext cx="8679955" cy="4802187"/>
+            <a:off x="1106398" y="1337003"/>
+            <a:ext cx="9979204" cy="5520997"/>
           </a:xfrm>
           <a:prstGeom prst="rect">
             <a:avLst/>

</xml_diff>